<commit_message>
Almost done with team stats page
</commit_message>
<xml_diff>
--- a/presentations/1_mockup_presentation.pptx
+++ b/presentations/1_mockup_presentation.pptx
@@ -383,6 +383,118 @@
 </p188:cmLst>
 </file>
 
+<file path=ppt/ink/ink1.xml><?xml version="1.0" encoding="utf-8"?>
+<inkml:ink xmlns:inkml="http://www.w3.org/2003/InkML">
+  <inkml:definitions>
+    <inkml:context xml:id="ctx0">
+      <inkml:inkSource xml:id="inkSrc0">
+        <inkml:traceFormat>
+          <inkml:channel name="X" type="integer" min="-2.14748E9" max="2.14748E9" units="cm"/>
+          <inkml:channel name="Y" type="integer" min="-2.14748E9" max="2.14748E9" units="cm"/>
+          <inkml:channel name="F" type="integer" max="32767" units="dev"/>
+        </inkml:traceFormat>
+        <inkml:channelProperties>
+          <inkml:channelProperty channel="X" name="resolution" value="1000" units="1/cm"/>
+          <inkml:channelProperty channel="Y" name="resolution" value="1000" units="1/cm"/>
+          <inkml:channelProperty channel="F" name="resolution" value="0" units="1/dev"/>
+        </inkml:channelProperties>
+      </inkml:inkSource>
+      <inkml:timestamp xml:id="ts0" timeString="2025-11-19T20:15:03.499"/>
+    </inkml:context>
+    <inkml:brush xml:id="br0">
+      <inkml:brushProperty name="width" value="0.05" units="cm"/>
+      <inkml:brushProperty name="height" value="0.05" units="cm"/>
+      <inkml:brushProperty name="color" value="#E71224"/>
+    </inkml:brush>
+  </inkml:definitions>
+  <inkml:trace contextRef="#ctx0" brushRef="#br0">2 1188 24575,'0'30'0,"-1"-13"0,1 1 0,4 25 0,-3-37 0,0-1 0,0 1 0,1-1 0,0 1 0,0-1 0,0 0 0,1 0 0,0 0 0,0 0 0,0-1 0,7 9 0,-7-11 0,-2 0 0,0-1 0,0 1 0,0-1 0,0 1 0,1-1 0,-1 0 0,1 0 0,-1 0 0,1 0 0,-1 0 0,1 0 0,-1 0 0,1 0 0,0 0 0,2 0 0,-3-2 0,1 0 0,0 0 0,0 0 0,-1 0 0,1 0 0,-1-1 0,1 1 0,-1 0 0,1-1 0,-1 1 0,0-1 0,0 1 0,0-1 0,0 0 0,0 0 0,0 1 0,0-1 0,0-2 0,67-132 0,10-18 0,144-177 0,28 17 0,46-61 0,-264 337-1365,-20 28-5461</inkml:trace>
+</inkml:ink>
+</file>
+
+<file path=ppt/ink/ink2.xml><?xml version="1.0" encoding="utf-8"?>
+<inkml:ink xmlns:inkml="http://www.w3.org/2003/InkML">
+  <inkml:definitions>
+    <inkml:context xml:id="ctx0">
+      <inkml:inkSource xml:id="inkSrc0">
+        <inkml:traceFormat>
+          <inkml:channel name="X" type="integer" min="-2.14748E9" max="2.14748E9" units="cm"/>
+          <inkml:channel name="Y" type="integer" min="-2.14748E9" max="2.14748E9" units="cm"/>
+          <inkml:channel name="F" type="integer" max="32767" units="dev"/>
+        </inkml:traceFormat>
+        <inkml:channelProperties>
+          <inkml:channelProperty channel="X" name="resolution" value="1000" units="1/cm"/>
+          <inkml:channelProperty channel="Y" name="resolution" value="1000" units="1/cm"/>
+          <inkml:channelProperty channel="F" name="resolution" value="0" units="1/dev"/>
+        </inkml:channelProperties>
+      </inkml:inkSource>
+      <inkml:timestamp xml:id="ts0" timeString="2025-11-19T20:15:07.226"/>
+    </inkml:context>
+    <inkml:brush xml:id="br0">
+      <inkml:brushProperty name="width" value="0.05" units="cm"/>
+      <inkml:brushProperty name="height" value="0.05" units="cm"/>
+      <inkml:brushProperty name="color" value="#E71224"/>
+    </inkml:brush>
+  </inkml:definitions>
+  <inkml:trace contextRef="#ctx0" brushRef="#br0">0 1142 24575,'17'44'0,"10"42"0,70 194 0,-96-279 0,-1 0 0,1 0 0,0 0 0,-1 0 0,1 0 0,0 0 0,0 0 0,0 0 0,0-1 0,0 1 0,0 0 0,0 0 0,0-1 0,0 1 0,0-1 0,0 1 0,0-1 0,0 1 0,0-1 0,0 0 0,1 1 0,-1-1 0,0 0 0,0 0 0,1 0 0,-1 0 0,0 0 0,0 0 0,0 0 0,1 0 0,-1-1 0,0 1 0,0 0 0,0-1 0,2 0 0,7-3 0,1-1 0,-2 1 0,14-9 0,-12 6 0,321-220 36,-9-36-389,-264 214 110,931-793-3366,-822 692-413</inkml:trace>
+</inkml:ink>
+</file>
+
+<file path=ppt/ink/ink3.xml><?xml version="1.0" encoding="utf-8"?>
+<inkml:ink xmlns:inkml="http://www.w3.org/2003/InkML">
+  <inkml:definitions>
+    <inkml:context xml:id="ctx0">
+      <inkml:inkSource xml:id="inkSrc0">
+        <inkml:traceFormat>
+          <inkml:channel name="X" type="integer" min="-2.14748E9" max="2.14748E9" units="cm"/>
+          <inkml:channel name="Y" type="integer" min="-2.14748E9" max="2.14748E9" units="cm"/>
+          <inkml:channel name="F" type="integer" max="32767" units="dev"/>
+        </inkml:traceFormat>
+        <inkml:channelProperties>
+          <inkml:channelProperty channel="X" name="resolution" value="1000" units="1/cm"/>
+          <inkml:channelProperty channel="Y" name="resolution" value="1000" units="1/cm"/>
+          <inkml:channelProperty channel="F" name="resolution" value="0" units="1/dev"/>
+        </inkml:channelProperties>
+      </inkml:inkSource>
+      <inkml:timestamp xml:id="ts0" timeString="2025-11-19T20:15:15.116"/>
+    </inkml:context>
+    <inkml:brush xml:id="br0">
+      <inkml:brushProperty name="width" value="0.05" units="cm"/>
+      <inkml:brushProperty name="height" value="0.05" units="cm"/>
+      <inkml:brushProperty name="color" value="#E71224"/>
+    </inkml:brush>
+  </inkml:definitions>
+  <inkml:trace contextRef="#ctx0" brushRef="#br0">0 410 24575,'1'9'0,"0"0"0,1 0 0,0 0 0,1 0 0,6 15 0,3 14 0,-10-30 0,8 30 0,-2 0 0,-1 1 0,2 55 0,-7-55 0,8 45 0,-3-34 0,0-32 0,-7-18 0,0 0 0,1 0 0,-1 0 0,0 1 0,1-1 0,-1 0 0,0 0 0,1 0 0,-1 0 0,0 0 0,1 1 0,-1-1 0,0 0 0,1 0 0,-1 0 0,1 0 0,-1 0 0,0 0 0,1-1 0,-1 1 0,0 0 0,1 0 0,-1 0 0,1 0 0,-1 0 0,0 0 0,1-1 0,-1 1 0,4-3 0,-1 1 0,0-1 0,0 0 0,0 0 0,-1-1 0,1 1 0,3-7 0,35-60 0,55-134 0,-66 135 0,129-302-1365,-85 192-5461</inkml:trace>
+</inkml:ink>
+</file>
+
+<file path=ppt/ink/ink4.xml><?xml version="1.0" encoding="utf-8"?>
+<inkml:ink xmlns:inkml="http://www.w3.org/2003/InkML">
+  <inkml:definitions>
+    <inkml:context xml:id="ctx0">
+      <inkml:inkSource xml:id="inkSrc0">
+        <inkml:traceFormat>
+          <inkml:channel name="X" type="integer" min="-2.14748E9" max="2.14748E9" units="cm"/>
+          <inkml:channel name="Y" type="integer" min="-2.14748E9" max="2.14748E9" units="cm"/>
+          <inkml:channel name="F" type="integer" max="32767" units="dev"/>
+        </inkml:traceFormat>
+        <inkml:channelProperties>
+          <inkml:channelProperty channel="X" name="resolution" value="1000" units="1/cm"/>
+          <inkml:channelProperty channel="Y" name="resolution" value="1000" units="1/cm"/>
+          <inkml:channelProperty channel="F" name="resolution" value="0" units="1/dev"/>
+        </inkml:channelProperties>
+      </inkml:inkSource>
+      <inkml:timestamp xml:id="ts0" timeString="2025-11-19T20:41:03.398"/>
+    </inkml:context>
+    <inkml:brush xml:id="br0">
+      <inkml:brushProperty name="width" value="0.05" units="cm"/>
+      <inkml:brushProperty name="height" value="0.05" units="cm"/>
+      <inkml:brushProperty name="color" value="#E71224"/>
+    </inkml:brush>
+  </inkml:definitions>
+  <inkml:trace contextRef="#ctx0" brushRef="#br0">0 853 24575,'4'5'0,"-1"1"0,0-1 0,-1 0 0,1 1 0,-1 0 0,0 0 0,0 0 0,1 8 0,5 14 0,15 33 0,-3-12 0,-3 0 0,20 88 0,-37-136 0,0 1 0,0 0 0,0-1 0,1 1 0,-1-1 0,0 1 0,1-1 0,0 1 0,-1-1 0,1 0 0,0 1 0,-1-1 0,1 0 0,0 1 0,0-1 0,0 0 0,0 0 0,0 0 0,1 0 0,1 2 0,-2-3 0,0 0 0,0 0 0,0 0 0,0 0 0,0 0 0,0 0 0,1 0 0,-1 0 0,0 0 0,0 0 0,0-1 0,0 1 0,0-1 0,0 1 0,0 0 0,0-1 0,0 0 0,0 1 0,0-1 0,0 0 0,1 0 0,6-6 0,-1-1 0,1 0 0,-1 0 0,9-15 0,25-46 0,-2-1 0,33-88 0,-40 85 0,246-604 0,-239 544-1365,-34 108-5461</inkml:trace>
+</inkml:ink>
+</file>
+
 <file path=ppt/notesMasters/notesMaster1.xml><?xml version="1.0" encoding="utf-8"?>
 <p:notesMaster xmlns:a="http://schemas.openxmlformats.org/drawingml/2006/main" xmlns:r="http://schemas.openxmlformats.org/officeDocument/2006/relationships" xmlns:p="http://schemas.openxmlformats.org/presentationml/2006/main">
   <p:cSld>
@@ -465,7 +577,7 @@
           <a:p>
             <a:fld id="{2139599A-F55A-43CD-BD42-27C7A89EA2FB}" type="datetimeFigureOut">
               <a:rPr lang="hr-HR" smtClean="0"/>
-              <a:t>20.10.2025.</a:t>
+              <a:t>19.11.2025.</a:t>
             </a:fld>
             <a:endParaRPr lang="hr-HR"/>
           </a:p>
@@ -945,7 +1057,7 @@
           <a:p>
             <a:fld id="{F971FB43-724D-437A-A5E8-1D673BA80D2D}" type="datetimeFigureOut">
               <a:rPr lang="hr-HR" smtClean="0"/>
-              <a:t>20.10.2025.</a:t>
+              <a:t>19.11.2025.</a:t>
             </a:fld>
             <a:endParaRPr lang="hr-HR"/>
           </a:p>
@@ -1113,7 +1225,7 @@
           <a:p>
             <a:fld id="{F971FB43-724D-437A-A5E8-1D673BA80D2D}" type="datetimeFigureOut">
               <a:rPr lang="hr-HR" smtClean="0"/>
-              <a:t>20.10.2025.</a:t>
+              <a:t>19.11.2025.</a:t>
             </a:fld>
             <a:endParaRPr lang="hr-HR"/>
           </a:p>
@@ -1291,7 +1403,7 @@
           <a:p>
             <a:fld id="{F971FB43-724D-437A-A5E8-1D673BA80D2D}" type="datetimeFigureOut">
               <a:rPr lang="hr-HR" smtClean="0"/>
-              <a:t>20.10.2025.</a:t>
+              <a:t>19.11.2025.</a:t>
             </a:fld>
             <a:endParaRPr lang="hr-HR"/>
           </a:p>
@@ -1459,7 +1571,7 @@
           <a:p>
             <a:fld id="{F971FB43-724D-437A-A5E8-1D673BA80D2D}" type="datetimeFigureOut">
               <a:rPr lang="hr-HR" smtClean="0"/>
-              <a:t>20.10.2025.</a:t>
+              <a:t>19.11.2025.</a:t>
             </a:fld>
             <a:endParaRPr lang="hr-HR"/>
           </a:p>
@@ -1704,7 +1816,7 @@
           <a:p>
             <a:fld id="{F971FB43-724D-437A-A5E8-1D673BA80D2D}" type="datetimeFigureOut">
               <a:rPr lang="hr-HR" smtClean="0"/>
-              <a:t>20.10.2025.</a:t>
+              <a:t>19.11.2025.</a:t>
             </a:fld>
             <a:endParaRPr lang="hr-HR"/>
           </a:p>
@@ -1933,7 +2045,7 @@
           <a:p>
             <a:fld id="{F971FB43-724D-437A-A5E8-1D673BA80D2D}" type="datetimeFigureOut">
               <a:rPr lang="hr-HR" smtClean="0"/>
-              <a:t>20.10.2025.</a:t>
+              <a:t>19.11.2025.</a:t>
             </a:fld>
             <a:endParaRPr lang="hr-HR"/>
           </a:p>
@@ -2297,7 +2409,7 @@
           <a:p>
             <a:fld id="{F971FB43-724D-437A-A5E8-1D673BA80D2D}" type="datetimeFigureOut">
               <a:rPr lang="hr-HR" smtClean="0"/>
-              <a:t>20.10.2025.</a:t>
+              <a:t>19.11.2025.</a:t>
             </a:fld>
             <a:endParaRPr lang="hr-HR"/>
           </a:p>
@@ -2414,7 +2526,7 @@
           <a:p>
             <a:fld id="{F971FB43-724D-437A-A5E8-1D673BA80D2D}" type="datetimeFigureOut">
               <a:rPr lang="hr-HR" smtClean="0"/>
-              <a:t>20.10.2025.</a:t>
+              <a:t>19.11.2025.</a:t>
             </a:fld>
             <a:endParaRPr lang="hr-HR"/>
           </a:p>
@@ -2509,7 +2621,7 @@
           <a:p>
             <a:fld id="{F971FB43-724D-437A-A5E8-1D673BA80D2D}" type="datetimeFigureOut">
               <a:rPr lang="hr-HR" smtClean="0"/>
-              <a:t>20.10.2025.</a:t>
+              <a:t>19.11.2025.</a:t>
             </a:fld>
             <a:endParaRPr lang="hr-HR"/>
           </a:p>
@@ -2784,7 +2896,7 @@
           <a:p>
             <a:fld id="{F971FB43-724D-437A-A5E8-1D673BA80D2D}" type="datetimeFigureOut">
               <a:rPr lang="hr-HR" smtClean="0"/>
-              <a:t>20.10.2025.</a:t>
+              <a:t>19.11.2025.</a:t>
             </a:fld>
             <a:endParaRPr lang="hr-HR"/>
           </a:p>
@@ -3036,7 +3148,7 @@
           <a:p>
             <a:fld id="{F971FB43-724D-437A-A5E8-1D673BA80D2D}" type="datetimeFigureOut">
               <a:rPr lang="hr-HR" smtClean="0"/>
-              <a:t>20.10.2025.</a:t>
+              <a:t>19.11.2025.</a:t>
             </a:fld>
             <a:endParaRPr lang="hr-HR"/>
           </a:p>
@@ -3247,7 +3359,7 @@
           <a:p>
             <a:fld id="{F971FB43-724D-437A-A5E8-1D673BA80D2D}" type="datetimeFigureOut">
               <a:rPr lang="hr-HR" smtClean="0"/>
-              <a:t>20.10.2025.</a:t>
+              <a:t>19.11.2025.</a:t>
             </a:fld>
             <a:endParaRPr lang="hr-HR"/>
           </a:p>
@@ -4529,7 +4641,7 @@
               <a:buAutoNum type="arabicPeriod"/>
             </a:pPr>
             <a:r>
-              <a:rPr lang="en-US" b="1">
+              <a:rPr lang="en-US" b="1" dirty="0">
                 <a:solidFill>
                   <a:schemeClr val="tx1">
                     <a:lumMod val="95000"/>
@@ -4865,6 +4977,245 @@
           </a:prstGeom>
         </p:spPr>
       </p:pic>
+      <mc:AlternateContent xmlns:mc="http://schemas.openxmlformats.org/markup-compatibility/2006">
+        <mc:Choice xmlns:p14="http://schemas.microsoft.com/office/powerpoint/2010/main" Requires="p14">
+          <p:contentPart p14:bwMode="auto" r:id="rId4">
+            <p14:nvContentPartPr>
+              <p14:cNvPr id="3" name="Rukopis 2">
+                <a:extLst>
+                  <a:ext uri="{FF2B5EF4-FFF2-40B4-BE49-F238E27FC236}">
+                    <a16:creationId xmlns:a16="http://schemas.microsoft.com/office/drawing/2014/main" id="{08DBEE57-2B5C-895C-719C-206A54125DA9}"/>
+                  </a:ext>
+                </a:extLst>
+              </p14:cNvPr>
+              <p14:cNvContentPartPr/>
+              <p14:nvPr/>
+            </p14:nvContentPartPr>
+            <p14:xfrm>
+              <a:off x="1728720" y="4083120"/>
+              <a:ext cx="377640" cy="499680"/>
+            </p14:xfrm>
+          </p:contentPart>
+        </mc:Choice>
+        <mc:Fallback>
+          <p:pic>
+            <p:nvPicPr>
+              <p:cNvPr id="3" name="Rukopis 2">
+                <a:extLst>
+                  <a:ext uri="{FF2B5EF4-FFF2-40B4-BE49-F238E27FC236}">
+                    <a16:creationId xmlns:a16="http://schemas.microsoft.com/office/drawing/2014/main" id="{08DBEE57-2B5C-895C-719C-206A54125DA9}"/>
+                  </a:ext>
+                </a:extLst>
+              </p:cNvPr>
+              <p:cNvPicPr/>
+              <p:nvPr/>
+            </p:nvPicPr>
+            <p:blipFill>
+              <a:blip r:embed="rId5"/>
+              <a:stretch>
+                <a:fillRect/>
+              </a:stretch>
+            </p:blipFill>
+            <p:spPr>
+              <a:xfrm>
+                <a:off x="1720080" y="4074120"/>
+                <a:ext cx="395280" cy="517320"/>
+              </a:xfrm>
+              <a:prstGeom prst="rect">
+                <a:avLst/>
+              </a:prstGeom>
+            </p:spPr>
+          </p:pic>
+        </mc:Fallback>
+      </mc:AlternateContent>
+      <mc:AlternateContent xmlns:mc="http://schemas.openxmlformats.org/markup-compatibility/2006">
+        <mc:Choice xmlns:p14="http://schemas.microsoft.com/office/powerpoint/2010/main" Requires="p14">
+          <p:contentPart p14:bwMode="auto" r:id="rId6">
+            <p14:nvContentPartPr>
+              <p14:cNvPr id="4" name="Rukopis 3">
+                <a:extLst>
+                  <a:ext uri="{FF2B5EF4-FFF2-40B4-BE49-F238E27FC236}">
+                    <a16:creationId xmlns:a16="http://schemas.microsoft.com/office/drawing/2014/main" id="{BCFB1BA7-463E-FDEA-0BCA-B2938E318B23}"/>
+                  </a:ext>
+                </a:extLst>
+              </p14:cNvPr>
+              <p14:cNvContentPartPr/>
+              <p14:nvPr/>
+            </p14:nvContentPartPr>
+            <p14:xfrm>
+              <a:off x="1341000" y="1996560"/>
+              <a:ext cx="761760" cy="564840"/>
+            </p14:xfrm>
+          </p:contentPart>
+        </mc:Choice>
+        <mc:Fallback>
+          <p:pic>
+            <p:nvPicPr>
+              <p:cNvPr id="4" name="Rukopis 3">
+                <a:extLst>
+                  <a:ext uri="{FF2B5EF4-FFF2-40B4-BE49-F238E27FC236}">
+                    <a16:creationId xmlns:a16="http://schemas.microsoft.com/office/drawing/2014/main" id="{BCFB1BA7-463E-FDEA-0BCA-B2938E318B23}"/>
+                  </a:ext>
+                </a:extLst>
+              </p:cNvPr>
+              <p:cNvPicPr/>
+              <p:nvPr/>
+            </p:nvPicPr>
+            <p:blipFill>
+              <a:blip r:embed="rId7"/>
+              <a:stretch>
+                <a:fillRect/>
+              </a:stretch>
+            </p:blipFill>
+            <p:spPr>
+              <a:xfrm>
+                <a:off x="1332000" y="1987920"/>
+                <a:ext cx="779400" cy="582480"/>
+              </a:xfrm>
+              <a:prstGeom prst="rect">
+                <a:avLst/>
+              </a:prstGeom>
+            </p:spPr>
+          </p:pic>
+        </mc:Fallback>
+      </mc:AlternateContent>
+      <mc:AlternateContent xmlns:mc="http://schemas.openxmlformats.org/markup-compatibility/2006">
+        <mc:Choice xmlns:p14="http://schemas.microsoft.com/office/powerpoint/2010/main" Requires="p14">
+          <p:contentPart p14:bwMode="auto" r:id="rId8">
+            <p14:nvContentPartPr>
+              <p14:cNvPr id="6" name="Rukopis 5">
+                <a:extLst>
+                  <a:ext uri="{FF2B5EF4-FFF2-40B4-BE49-F238E27FC236}">
+                    <a16:creationId xmlns:a16="http://schemas.microsoft.com/office/drawing/2014/main" id="{3AFB62BE-8A19-7111-FF40-FD6661DD6081}"/>
+                  </a:ext>
+                </a:extLst>
+              </p14:cNvPr>
+              <p14:cNvContentPartPr/>
+              <p14:nvPr/>
+            </p14:nvContentPartPr>
+            <p14:xfrm>
+              <a:off x="1508400" y="3258360"/>
+              <a:ext cx="190800" cy="333720"/>
+            </p14:xfrm>
+          </p:contentPart>
+        </mc:Choice>
+        <mc:Fallback>
+          <p:pic>
+            <p:nvPicPr>
+              <p:cNvPr id="6" name="Rukopis 5">
+                <a:extLst>
+                  <a:ext uri="{FF2B5EF4-FFF2-40B4-BE49-F238E27FC236}">
+                    <a16:creationId xmlns:a16="http://schemas.microsoft.com/office/drawing/2014/main" id="{3AFB62BE-8A19-7111-FF40-FD6661DD6081}"/>
+                  </a:ext>
+                </a:extLst>
+              </p:cNvPr>
+              <p:cNvPicPr/>
+              <p:nvPr/>
+            </p:nvPicPr>
+            <p:blipFill>
+              <a:blip r:embed="rId9"/>
+              <a:stretch>
+                <a:fillRect/>
+              </a:stretch>
+            </p:blipFill>
+            <p:spPr>
+              <a:xfrm>
+                <a:off x="1499400" y="3249720"/>
+                <a:ext cx="208440" cy="351360"/>
+              </a:xfrm>
+              <a:prstGeom prst="rect">
+                <a:avLst/>
+              </a:prstGeom>
+            </p:spPr>
+          </p:pic>
+        </mc:Fallback>
+      </mc:AlternateContent>
+      <mc:AlternateContent xmlns:mc="http://schemas.openxmlformats.org/markup-compatibility/2006">
+        <mc:Choice xmlns:p14="http://schemas.microsoft.com/office/powerpoint/2010/main" Requires="p14">
+          <p:contentPart p14:bwMode="auto" r:id="rId10">
+            <p14:nvContentPartPr>
+              <p14:cNvPr id="7" name="Rukopis 6">
+                <a:extLst>
+                  <a:ext uri="{FF2B5EF4-FFF2-40B4-BE49-F238E27FC236}">
+                    <a16:creationId xmlns:a16="http://schemas.microsoft.com/office/drawing/2014/main" id="{7616EFFA-7C57-BD96-0B80-ECDDEC38E07A}"/>
+                  </a:ext>
+                </a:extLst>
+              </p14:cNvPr>
+              <p14:cNvContentPartPr/>
+              <p14:nvPr/>
+            </p14:nvContentPartPr>
+            <p14:xfrm>
+              <a:off x="1317960" y="1186200"/>
+              <a:ext cx="259920" cy="456120"/>
+            </p14:xfrm>
+          </p:contentPart>
+        </mc:Choice>
+        <mc:Fallback>
+          <p:pic>
+            <p:nvPicPr>
+              <p:cNvPr id="7" name="Rukopis 6">
+                <a:extLst>
+                  <a:ext uri="{FF2B5EF4-FFF2-40B4-BE49-F238E27FC236}">
+                    <a16:creationId xmlns:a16="http://schemas.microsoft.com/office/drawing/2014/main" id="{7616EFFA-7C57-BD96-0B80-ECDDEC38E07A}"/>
+                  </a:ext>
+                </a:extLst>
+              </p:cNvPr>
+              <p:cNvPicPr/>
+              <p:nvPr/>
+            </p:nvPicPr>
+            <p:blipFill>
+              <a:blip r:embed="rId11"/>
+              <a:stretch>
+                <a:fillRect/>
+              </a:stretch>
+            </p:blipFill>
+            <p:spPr>
+              <a:xfrm>
+                <a:off x="1308960" y="1177200"/>
+                <a:ext cx="277560" cy="473760"/>
+              </a:xfrm>
+              <a:prstGeom prst="rect">
+                <a:avLst/>
+              </a:prstGeom>
+            </p:spPr>
+          </p:pic>
+        </mc:Fallback>
+      </mc:AlternateContent>
+      <p:sp>
+        <p:nvSpPr>
+          <p:cNvPr id="8" name="TekstniOkvir 7">
+            <a:extLst>
+              <a:ext uri="{FF2B5EF4-FFF2-40B4-BE49-F238E27FC236}">
+                <a16:creationId xmlns:a16="http://schemas.microsoft.com/office/drawing/2014/main" id="{CC9F95BF-A3CF-5AB1-97D4-290FB7A53B70}"/>
+              </a:ext>
+            </a:extLst>
+          </p:cNvPr>
+          <p:cNvSpPr txBox="1"/>
+          <p:nvPr/>
+        </p:nvSpPr>
+        <p:spPr>
+          <a:xfrm>
+            <a:off x="289560" y="4610623"/>
+            <a:ext cx="3436620" cy="369332"/>
+          </a:xfrm>
+          <a:prstGeom prst="rect">
+            <a:avLst/>
+          </a:prstGeom>
+          <a:noFill/>
+        </p:spPr>
+        <p:txBody>
+          <a:bodyPr wrap="square" rtlCol="0">
+            <a:spAutoFit/>
+          </a:bodyPr>
+          <a:lstStyle/>
+          <a:p>
+            <a:r>
+              <a:rPr lang="hr-HR" dirty="0"/>
+              <a:t>DODAJ FILTER ZA STATISTIKU</a:t>
+            </a:r>
+          </a:p>
+        </p:txBody>
+      </p:sp>
     </p:spTree>
     <p:extLst>
       <p:ext uri="{BB962C8B-B14F-4D97-AF65-F5344CB8AC3E}">
@@ -5062,7 +5413,7 @@
           <a:lstStyle/>
           <a:p>
             <a:r>
-              <a:rPr lang="en-US" b="1">
+              <a:rPr lang="en-US" b="1" dirty="0">
                 <a:solidFill>
                   <a:schemeClr val="tx1">
                     <a:lumMod val="95000"/>
@@ -5072,7 +5423,7 @@
               </a:rPr>
               <a:t>2.  Graph: player statistics</a:t>
             </a:r>
-            <a:endParaRPr lang="en-US">
+            <a:endParaRPr lang="en-US" dirty="0">
               <a:solidFill>
                 <a:schemeClr val="tx1">
                   <a:lumMod val="95000"/>
@@ -5082,7 +5433,7 @@
             </a:endParaRPr>
           </a:p>
           <a:p>
-            <a:endParaRPr lang="en-US"/>
+            <a:endParaRPr lang="en-US" dirty="0"/>
           </a:p>
         </p:txBody>
       </p:sp>
@@ -5522,7 +5873,7 @@
           <a:lstStyle/>
           <a:p>
             <a:r>
-              <a:rPr lang="en-US" b="1">
+              <a:rPr lang="en-US" b="1" dirty="0">
                 <a:solidFill>
                   <a:schemeClr val="tx1">
                     <a:lumMod val="95000"/>
@@ -5532,7 +5883,7 @@
               </a:rPr>
               <a:t>3.  Graph: clutch factor</a:t>
             </a:r>
-            <a:endParaRPr lang="en-US">
+            <a:endParaRPr lang="en-US" dirty="0">
               <a:solidFill>
                 <a:schemeClr val="tx1">
                   <a:lumMod val="95000"/>
@@ -5542,10 +5893,10 @@
             </a:endParaRPr>
           </a:p>
           <a:p>
-            <a:endParaRPr lang="en-US"/>
-          </a:p>
-          <a:p>
-            <a:endParaRPr lang="en-US"/>
+            <a:endParaRPr lang="en-US" dirty="0"/>
+          </a:p>
+          <a:p>
+            <a:endParaRPr lang="en-US" dirty="0"/>
           </a:p>
         </p:txBody>
       </p:sp>

</xml_diff>

<commit_message>
Vise manje gotov player stats page, dodaj DATE FILTER
</commit_message>
<xml_diff>
--- a/presentations/1_mockup_presentation.pptx
+++ b/presentations/1_mockup_presentation.pptx
@@ -4977,8 +4977,8 @@
           </a:prstGeom>
         </p:spPr>
       </p:pic>
-      <mc:AlternateContent xmlns:mc="http://schemas.openxmlformats.org/markup-compatibility/2006">
-        <mc:Choice xmlns:p14="http://schemas.microsoft.com/office/powerpoint/2010/main" Requires="p14">
+      <mc:AlternateContent xmlns:mc="http://schemas.openxmlformats.org/markup-compatibility/2006" xmlns:p14="http://schemas.microsoft.com/office/powerpoint/2010/main">
+        <mc:Choice Requires="p14">
           <p:contentPart p14:bwMode="auto" r:id="rId4">
             <p14:nvContentPartPr>
               <p14:cNvPr id="3" name="Rukopis 2">
@@ -4997,7 +4997,7 @@
             </p14:xfrm>
           </p:contentPart>
         </mc:Choice>
-        <mc:Fallback>
+        <mc:Fallback xmlns="">
           <p:pic>
             <p:nvPicPr>
               <p:cNvPr id="3" name="Rukopis 2">
@@ -5028,8 +5028,8 @@
           </p:pic>
         </mc:Fallback>
       </mc:AlternateContent>
-      <mc:AlternateContent xmlns:mc="http://schemas.openxmlformats.org/markup-compatibility/2006">
-        <mc:Choice xmlns:p14="http://schemas.microsoft.com/office/powerpoint/2010/main" Requires="p14">
+      <mc:AlternateContent xmlns:mc="http://schemas.openxmlformats.org/markup-compatibility/2006" xmlns:p14="http://schemas.microsoft.com/office/powerpoint/2010/main">
+        <mc:Choice Requires="p14">
           <p:contentPart p14:bwMode="auto" r:id="rId6">
             <p14:nvContentPartPr>
               <p14:cNvPr id="4" name="Rukopis 3">
@@ -5048,7 +5048,7 @@
             </p14:xfrm>
           </p:contentPart>
         </mc:Choice>
-        <mc:Fallback>
+        <mc:Fallback xmlns="">
           <p:pic>
             <p:nvPicPr>
               <p:cNvPr id="4" name="Rukopis 3">
@@ -5079,8 +5079,8 @@
           </p:pic>
         </mc:Fallback>
       </mc:AlternateContent>
-      <mc:AlternateContent xmlns:mc="http://schemas.openxmlformats.org/markup-compatibility/2006">
-        <mc:Choice xmlns:p14="http://schemas.microsoft.com/office/powerpoint/2010/main" Requires="p14">
+      <mc:AlternateContent xmlns:mc="http://schemas.openxmlformats.org/markup-compatibility/2006" xmlns:p14="http://schemas.microsoft.com/office/powerpoint/2010/main">
+        <mc:Choice Requires="p14">
           <p:contentPart p14:bwMode="auto" r:id="rId8">
             <p14:nvContentPartPr>
               <p14:cNvPr id="6" name="Rukopis 5">
@@ -5099,7 +5099,7 @@
             </p14:xfrm>
           </p:contentPart>
         </mc:Choice>
-        <mc:Fallback>
+        <mc:Fallback xmlns="">
           <p:pic>
             <p:nvPicPr>
               <p:cNvPr id="6" name="Rukopis 5">
@@ -5130,8 +5130,8 @@
           </p:pic>
         </mc:Fallback>
       </mc:AlternateContent>
-      <mc:AlternateContent xmlns:mc="http://schemas.openxmlformats.org/markup-compatibility/2006">
-        <mc:Choice xmlns:p14="http://schemas.microsoft.com/office/powerpoint/2010/main" Requires="p14">
+      <mc:AlternateContent xmlns:mc="http://schemas.openxmlformats.org/markup-compatibility/2006" xmlns:p14="http://schemas.microsoft.com/office/powerpoint/2010/main">
+        <mc:Choice Requires="p14">
           <p:contentPart p14:bwMode="auto" r:id="rId10">
             <p14:nvContentPartPr>
               <p14:cNvPr id="7" name="Rukopis 6">
@@ -5150,7 +5150,7 @@
             </p14:xfrm>
           </p:contentPart>
         </mc:Choice>
-        <mc:Fallback>
+        <mc:Fallback xmlns="">
           <p:pic>
             <p:nvPicPr>
               <p:cNvPr id="7" name="Rukopis 6">
@@ -5195,8 +5195,8 @@
         </p:nvSpPr>
         <p:spPr>
           <a:xfrm>
-            <a:off x="289560" y="4610623"/>
-            <a:ext cx="3436620" cy="369332"/>
+            <a:off x="289560" y="4610624"/>
+            <a:ext cx="5654040" cy="369332"/>
           </a:xfrm>
           <a:prstGeom prst="rect">
             <a:avLst/>
@@ -5211,7 +5211,7 @@
           <a:p>
             <a:r>
               <a:rPr lang="hr-HR" dirty="0"/>
-              <a:t>DODAJ FILTER ZA STATISTIKU</a:t>
+              <a:t>DODAJ FILTER ZA STATISTIKU, u smislu sta ide na y os</a:t>
             </a:r>
           </a:p>
         </p:txBody>

</xml_diff>

<commit_message>
Finished player stats layout
</commit_message>
<xml_diff>
--- a/presentations/1_mockup_presentation.pptx
+++ b/presentations/1_mockup_presentation.pptx
@@ -411,6 +411,34 @@
 </inkml:ink>
 </file>
 
+<file path=ppt/ink/ink10.xml><?xml version="1.0" encoding="utf-8"?>
+<inkml:ink xmlns:inkml="http://www.w3.org/2003/InkML">
+  <inkml:definitions>
+    <inkml:context xml:id="ctx0">
+      <inkml:inkSource xml:id="inkSrc0">
+        <inkml:traceFormat>
+          <inkml:channel name="X" type="integer" min="-2.14748E9" max="2.14748E9" units="cm"/>
+          <inkml:channel name="Y" type="integer" min="-2.14748E9" max="2.14748E9" units="cm"/>
+          <inkml:channel name="F" type="integer" max="32767" units="dev"/>
+        </inkml:traceFormat>
+        <inkml:channelProperties>
+          <inkml:channelProperty channel="X" name="resolution" value="1000" units="1/cm"/>
+          <inkml:channelProperty channel="Y" name="resolution" value="1000" units="1/cm"/>
+          <inkml:channelProperty channel="F" name="resolution" value="0" units="1/dev"/>
+        </inkml:channelProperties>
+      </inkml:inkSource>
+      <inkml:timestamp xml:id="ts0" timeString="2025-11-20T13:24:10.773"/>
+    </inkml:context>
+    <inkml:brush xml:id="br0">
+      <inkml:brushProperty name="width" value="0.05" units="cm"/>
+      <inkml:brushProperty name="height" value="0.05" units="cm"/>
+      <inkml:brushProperty name="color" value="#E71224"/>
+    </inkml:brush>
+  </inkml:definitions>
+  <inkml:trace contextRef="#ctx0" brushRef="#br0">1 976 24575,'1'1'0,"1"0"0,-1 0 0,0-1 0,1 1 0,-1 1 0,0-1 0,0 0 0,0 0 0,0 0 0,0 1 0,0-1 0,0 0 0,0 1 0,-1-1 0,1 1 0,0-1 0,-1 1 0,1 2 0,2 3 0,14 32 0,20 79 0,-25-77 0,32 79 0,68 83 0,-60-114 0,-47-77 0,-2-6 0,0 0 0,1 1 0,-1-2 0,1 1 0,5 6 0,-8-11 0,0 0 0,-1-1 0,1 1 0,0 0 0,0-1 0,-1 1 0,1-1 0,0 1 0,0-1 0,0 1 0,0-1 0,0 0 0,-1 0 0,1 1 0,0-1 0,0 0 0,0 0 0,0 0 0,0 0 0,0 0 0,0 0 0,0 0 0,0 0 0,0 0 0,0 0 0,0-1 0,0 1 0,0 0 0,-1-1 0,1 1 0,0-1 0,0 1 0,0-1 0,0 1 0,-1-1 0,1 1 0,0-1 0,-1 0 0,1 1 0,0-1 0,-1 0 0,1 0 0,-1 0 0,1 1 0,0-3 0,15-23 0,-1-1 0,-1 0 0,-1-1 0,11-36 0,-7 21 0,487-1259-1365,-445 1152-5461</inkml:trace>
+</inkml:ink>
+</file>
+
 <file path=ppt/ink/ink2.xml><?xml version="1.0" encoding="utf-8"?>
 <inkml:ink xmlns:inkml="http://www.w3.org/2003/InkML">
   <inkml:definitions>
@@ -495,6 +523,146 @@
 </inkml:ink>
 </file>
 
+<file path=ppt/ink/ink5.xml><?xml version="1.0" encoding="utf-8"?>
+<inkml:ink xmlns:inkml="http://www.w3.org/2003/InkML">
+  <inkml:definitions>
+    <inkml:context xml:id="ctx0">
+      <inkml:inkSource xml:id="inkSrc0">
+        <inkml:traceFormat>
+          <inkml:channel name="X" type="integer" min="-2.14748E9" max="2.14748E9" units="cm"/>
+          <inkml:channel name="Y" type="integer" min="-2.14748E9" max="2.14748E9" units="cm"/>
+          <inkml:channel name="F" type="integer" max="32767" units="dev"/>
+        </inkml:traceFormat>
+        <inkml:channelProperties>
+          <inkml:channelProperty channel="X" name="resolution" value="1000" units="1/cm"/>
+          <inkml:channelProperty channel="Y" name="resolution" value="1000" units="1/cm"/>
+          <inkml:channelProperty channel="F" name="resolution" value="0" units="1/dev"/>
+        </inkml:channelProperties>
+      </inkml:inkSource>
+      <inkml:timestamp xml:id="ts0" timeString="2025-11-20T13:23:58.313"/>
+    </inkml:context>
+    <inkml:brush xml:id="br0">
+      <inkml:brushProperty name="width" value="0.05" units="cm"/>
+      <inkml:brushProperty name="height" value="0.05" units="cm"/>
+      <inkml:brushProperty name="color" value="#E71224"/>
+    </inkml:brush>
+  </inkml:definitions>
+  <inkml:trace contextRef="#ctx0" brushRef="#br0">1 1281 24575,'1'0'0,"0"1"0,0-1 0,0 0 0,0 1 0,-1-1 0,1 0 0,0 1 0,0-1 0,0 1 0,0 0 0,-1-1 0,1 1 0,0 0 0,-1-1 0,1 1 0,0 0 0,-1 0 0,1 0 0,-1-1 0,1 1 0,-1 0 0,0 0 0,1 0 0,-1 1 0,9 31 0,-5-20 0,8 20 0,31 56 0,5 9 0,-46-92 0,9 18 0,-10-24 0,-1 1 0,1-1 0,0 1 0,-1 0 0,1-1 0,-1 1 0,1-1 0,0 0 0,0 1 0,-1-1 0,1 1 0,0-1 0,0 0 0,0 0 0,-1 0 0,1 1 0,0-1 0,0 0 0,0 0 0,-1 0 0,1 0 0,0 0 0,0 0 0,0 0 0,0-1 0,-1 1 0,1 0 0,0 0 0,0-1 0,1 0 0,7-5 0,0 0 0,0-1 0,-1-1 0,0 1 0,0-1 0,-1-1 0,0 1 0,11-18 0,1 0 0,494-721 0,-273 384 0,-182 276 0,95-130 0,-145 208-227,1 0-1,-1 0 1,1 1-1,1 0 1,11-8-1,4 3-6598</inkml:trace>
+</inkml:ink>
+</file>
+
+<file path=ppt/ink/ink6.xml><?xml version="1.0" encoding="utf-8"?>
+<inkml:ink xmlns:inkml="http://www.w3.org/2003/InkML">
+  <inkml:definitions>
+    <inkml:context xml:id="ctx0">
+      <inkml:inkSource xml:id="inkSrc0">
+        <inkml:traceFormat>
+          <inkml:channel name="X" type="integer" min="-2.14748E9" max="2.14748E9" units="cm"/>
+          <inkml:channel name="Y" type="integer" min="-2.14748E9" max="2.14748E9" units="cm"/>
+          <inkml:channel name="F" type="integer" max="32767" units="dev"/>
+        </inkml:traceFormat>
+        <inkml:channelProperties>
+          <inkml:channelProperty channel="X" name="resolution" value="1000" units="1/cm"/>
+          <inkml:channelProperty channel="Y" name="resolution" value="1000" units="1/cm"/>
+          <inkml:channelProperty channel="F" name="resolution" value="0" units="1/dev"/>
+        </inkml:channelProperties>
+      </inkml:inkSource>
+      <inkml:timestamp xml:id="ts0" timeString="2025-11-20T13:24:00.767"/>
+    </inkml:context>
+    <inkml:brush xml:id="br0">
+      <inkml:brushProperty name="width" value="0.05" units="cm"/>
+      <inkml:brushProperty name="height" value="0.05" units="cm"/>
+      <inkml:brushProperty name="color" value="#E71224"/>
+    </inkml:brush>
+  </inkml:definitions>
+  <inkml:trace contextRef="#ctx0" brushRef="#br0">0 1551 24575,'10'39'0,"-6"-24"0,-1 0 0,2 0 0,6 14 0,-9-26 0,-1 0 0,1 0 0,-1 0 0,1 0 0,0 0 0,0-1 0,0 1 0,1 0 0,-1-1 0,1 0 0,-1 0 0,1 0 0,0 0 0,0 0 0,0 0 0,0-1 0,0 1 0,6 1 0,-6-3 0,0 0 0,0 0 0,0 0 0,0 0 0,0 0 0,0-1 0,0 1 0,-1-1 0,1 0 0,0 0 0,0 0 0,0 0 0,-1 0 0,1-1 0,-1 1 0,1-1 0,-1 0 0,1 1 0,3-5 0,4-4 0,-1 0 0,15-21 0,63-104 0,-46 70 0,109-216 0,-78 139 0,436-816-1365,-478 901-5461</inkml:trace>
+</inkml:ink>
+</file>
+
+<file path=ppt/ink/ink7.xml><?xml version="1.0" encoding="utf-8"?>
+<inkml:ink xmlns:inkml="http://www.w3.org/2003/InkML">
+  <inkml:definitions>
+    <inkml:context xml:id="ctx0">
+      <inkml:inkSource xml:id="inkSrc0">
+        <inkml:traceFormat>
+          <inkml:channel name="X" type="integer" min="-2.14748E9" max="2.14748E9" units="cm"/>
+          <inkml:channel name="Y" type="integer" min="-2.14748E9" max="2.14748E9" units="cm"/>
+          <inkml:channel name="F" type="integer" max="32767" units="dev"/>
+        </inkml:traceFormat>
+        <inkml:channelProperties>
+          <inkml:channelProperty channel="X" name="resolution" value="1000" units="1/cm"/>
+          <inkml:channelProperty channel="Y" name="resolution" value="1000" units="1/cm"/>
+          <inkml:channelProperty channel="F" name="resolution" value="0" units="1/dev"/>
+        </inkml:channelProperties>
+      </inkml:inkSource>
+      <inkml:timestamp xml:id="ts0" timeString="2025-11-20T13:24:01.705"/>
+    </inkml:context>
+    <inkml:brush xml:id="br0">
+      <inkml:brushProperty name="width" value="0.05" units="cm"/>
+      <inkml:brushProperty name="height" value="0.05" units="cm"/>
+      <inkml:brushProperty name="color" value="#E71224"/>
+    </inkml:brush>
+  </inkml:definitions>
+  <inkml:trace contextRef="#ctx0" brushRef="#br0">0 1506 24575,'2'16'0,"1"0"0,0 0 0,1-1 0,0 1 0,2-1 0,0 0 0,9 17 0,-1 0 0,-7-14 0,1 0 0,0-1 0,1-1 0,0 1 0,2-1 0,0-1 0,0 0 0,15 13 0,-24-26 0,0 0 0,0-1 0,0 1 0,0-1 0,1 1 0,-1-1 0,0 0 0,1 0 0,-1 0 0,1 0 0,-1-1 0,1 1 0,-1-1 0,1 1 0,0-1 0,-1 0 0,1 0 0,0 0 0,-1 0 0,1-1 0,-1 1 0,1-1 0,-1 1 0,1-1 0,-1 0 0,1 0 0,-1 0 0,1 0 0,-1-1 0,0 1 0,0-1 0,0 1 0,3-3 0,5-5 0,-1-1 0,1-1 0,-2 1 0,1-1 0,6-13 0,-15 24 0,57-97 0,-5-3 0,49-127 0,-60 129 0,307-744 0,-263 628-1365,-9 29-5461</inkml:trace>
+</inkml:ink>
+</file>
+
+<file path=ppt/ink/ink8.xml><?xml version="1.0" encoding="utf-8"?>
+<inkml:ink xmlns:inkml="http://www.w3.org/2003/InkML">
+  <inkml:definitions>
+    <inkml:context xml:id="ctx0">
+      <inkml:inkSource xml:id="inkSrc0">
+        <inkml:traceFormat>
+          <inkml:channel name="X" type="integer" min="-2.14748E9" max="2.14748E9" units="cm"/>
+          <inkml:channel name="Y" type="integer" min="-2.14748E9" max="2.14748E9" units="cm"/>
+          <inkml:channel name="F" type="integer" max="32767" units="dev"/>
+        </inkml:traceFormat>
+        <inkml:channelProperties>
+          <inkml:channelProperty channel="X" name="resolution" value="1000" units="1/cm"/>
+          <inkml:channelProperty channel="Y" name="resolution" value="1000" units="1/cm"/>
+          <inkml:channelProperty channel="F" name="resolution" value="0" units="1/dev"/>
+        </inkml:channelProperties>
+      </inkml:inkSource>
+      <inkml:timestamp xml:id="ts0" timeString="2025-11-20T13:24:03.689"/>
+    </inkml:context>
+    <inkml:brush xml:id="br0">
+      <inkml:brushProperty name="width" value="0.05" units="cm"/>
+      <inkml:brushProperty name="height" value="0.05" units="cm"/>
+      <inkml:brushProperty name="color" value="#E71224"/>
+    </inkml:brush>
+  </inkml:definitions>
+  <inkml:trace contextRef="#ctx0" brushRef="#br0">0 1500 24575,'2'24'0,"2"0"0,0 0 0,2 0 0,1 0 0,0-1 0,13 25 0,-7-13 0,33 93 0,-46-128 0,0 0 0,0 1 0,0-1 0,0 0 0,0 0 0,0 1 0,0-1 0,0 0 0,0 1 0,0-1 0,1 0 0,-1 0 0,0 1 0,0-1 0,0 0 0,1 0 0,-1 1 0,0-1 0,0 0 0,0 0 0,1 0 0,-1 1 0,0-1 0,1 0 0,-1 0 0,0 0 0,0 0 0,1 0 0,-1 1 0,0-1 0,1 0 0,-1 0 0,0 0 0,1 0 0,-1 0 0,0 0 0,1 0 0,11-10 0,14-27 0,-22 30 0,58-101 0,56-134 0,-42 78 0,10-3 0,7 4 0,7 4 0,7 5 0,153-170 0,-99 149-1365,-15 24-5461</inkml:trace>
+</inkml:ink>
+</file>
+
+<file path=ppt/ink/ink9.xml><?xml version="1.0" encoding="utf-8"?>
+<inkml:ink xmlns:inkml="http://www.w3.org/2003/InkML">
+  <inkml:definitions>
+    <inkml:context xml:id="ctx0">
+      <inkml:inkSource xml:id="inkSrc0">
+        <inkml:traceFormat>
+          <inkml:channel name="X" type="integer" min="-2.14748E9" max="2.14748E9" units="cm"/>
+          <inkml:channel name="Y" type="integer" min="-2.14748E9" max="2.14748E9" units="cm"/>
+          <inkml:channel name="F" type="integer" max="32767" units="dev"/>
+        </inkml:traceFormat>
+        <inkml:channelProperties>
+          <inkml:channelProperty channel="X" name="resolution" value="1000" units="1/cm"/>
+          <inkml:channelProperty channel="Y" name="resolution" value="1000" units="1/cm"/>
+          <inkml:channelProperty channel="F" name="resolution" value="0" units="1/dev"/>
+        </inkml:channelProperties>
+      </inkml:inkSource>
+      <inkml:timestamp xml:id="ts0" timeString="2025-11-20T13:24:09.341"/>
+    </inkml:context>
+    <inkml:brush xml:id="br0">
+      <inkml:brushProperty name="width" value="0.05" units="cm"/>
+      <inkml:brushProperty name="height" value="0.05" units="cm"/>
+      <inkml:brushProperty name="color" value="#E71224"/>
+    </inkml:brush>
+  </inkml:definitions>
+  <inkml:trace contextRef="#ctx0" brushRef="#br0">1 836 24575,'0'5'0,"1"-1"0,0 1 0,1-1 0,-1 0 0,1 1 0,0-1 0,0 0 0,0 0 0,0 0 0,3 3 0,7 14 0,58 120 0,94 280 0,-161-408 0,-1-3 0,1 0 0,0 0 0,7 14 0,-10-23 0,0 0 0,1 0 0,-1 0 0,0-1 0,1 1 0,-1 0 0,1 0 0,-1 0 0,1 0 0,0-1 0,-1 1 0,1 0 0,0 0 0,-1-1 0,1 1 0,0 0 0,0-1 0,0 1 0,0-1 0,-1 1 0,1-1 0,0 0 0,0 1 0,0-1 0,0 0 0,0 0 0,0 0 0,0 1 0,0-1 0,0 0 0,0 0 0,0 0 0,0-1 0,0 1 0,0 0 0,0 0 0,0 0 0,0-1 0,0 1 0,0-1 0,0 1 0,0 0 0,1-2 0,2-1 0,0-1 0,0 1 0,0-1 0,0-1 0,-1 1 0,1 0 0,-1-1 0,4-8 0,21-49 0,-18 34 0,123-325 0,11-28 0,6 65 120,-107 240-863,102-137 1,-83 139-6084</inkml:trace>
+</inkml:ink>
+</file>
+
 <file path=ppt/notesMasters/notesMaster1.xml><?xml version="1.0" encoding="utf-8"?>
 <p:notesMaster xmlns:a="http://schemas.openxmlformats.org/drawingml/2006/main" xmlns:r="http://schemas.openxmlformats.org/officeDocument/2006/relationships" xmlns:p="http://schemas.openxmlformats.org/presentationml/2006/main">
   <p:cSld>
@@ -577,7 +745,7 @@
           <a:p>
             <a:fld id="{2139599A-F55A-43CD-BD42-27C7A89EA2FB}" type="datetimeFigureOut">
               <a:rPr lang="hr-HR" smtClean="0"/>
-              <a:t>19.11.2025.</a:t>
+              <a:t>20.11.2025.</a:t>
             </a:fld>
             <a:endParaRPr lang="hr-HR"/>
           </a:p>
@@ -1057,7 +1225,7 @@
           <a:p>
             <a:fld id="{F971FB43-724D-437A-A5E8-1D673BA80D2D}" type="datetimeFigureOut">
               <a:rPr lang="hr-HR" smtClean="0"/>
-              <a:t>19.11.2025.</a:t>
+              <a:t>20.11.2025.</a:t>
             </a:fld>
             <a:endParaRPr lang="hr-HR"/>
           </a:p>
@@ -1225,7 +1393,7 @@
           <a:p>
             <a:fld id="{F971FB43-724D-437A-A5E8-1D673BA80D2D}" type="datetimeFigureOut">
               <a:rPr lang="hr-HR" smtClean="0"/>
-              <a:t>19.11.2025.</a:t>
+              <a:t>20.11.2025.</a:t>
             </a:fld>
             <a:endParaRPr lang="hr-HR"/>
           </a:p>
@@ -1403,7 +1571,7 @@
           <a:p>
             <a:fld id="{F971FB43-724D-437A-A5E8-1D673BA80D2D}" type="datetimeFigureOut">
               <a:rPr lang="hr-HR" smtClean="0"/>
-              <a:t>19.11.2025.</a:t>
+              <a:t>20.11.2025.</a:t>
             </a:fld>
             <a:endParaRPr lang="hr-HR"/>
           </a:p>
@@ -1571,7 +1739,7 @@
           <a:p>
             <a:fld id="{F971FB43-724D-437A-A5E8-1D673BA80D2D}" type="datetimeFigureOut">
               <a:rPr lang="hr-HR" smtClean="0"/>
-              <a:t>19.11.2025.</a:t>
+              <a:t>20.11.2025.</a:t>
             </a:fld>
             <a:endParaRPr lang="hr-HR"/>
           </a:p>
@@ -1816,7 +1984,7 @@
           <a:p>
             <a:fld id="{F971FB43-724D-437A-A5E8-1D673BA80D2D}" type="datetimeFigureOut">
               <a:rPr lang="hr-HR" smtClean="0"/>
-              <a:t>19.11.2025.</a:t>
+              <a:t>20.11.2025.</a:t>
             </a:fld>
             <a:endParaRPr lang="hr-HR"/>
           </a:p>
@@ -2045,7 +2213,7 @@
           <a:p>
             <a:fld id="{F971FB43-724D-437A-A5E8-1D673BA80D2D}" type="datetimeFigureOut">
               <a:rPr lang="hr-HR" smtClean="0"/>
-              <a:t>19.11.2025.</a:t>
+              <a:t>20.11.2025.</a:t>
             </a:fld>
             <a:endParaRPr lang="hr-HR"/>
           </a:p>
@@ -2409,7 +2577,7 @@
           <a:p>
             <a:fld id="{F971FB43-724D-437A-A5E8-1D673BA80D2D}" type="datetimeFigureOut">
               <a:rPr lang="hr-HR" smtClean="0"/>
-              <a:t>19.11.2025.</a:t>
+              <a:t>20.11.2025.</a:t>
             </a:fld>
             <a:endParaRPr lang="hr-HR"/>
           </a:p>
@@ -2526,7 +2694,7 @@
           <a:p>
             <a:fld id="{F971FB43-724D-437A-A5E8-1D673BA80D2D}" type="datetimeFigureOut">
               <a:rPr lang="hr-HR" smtClean="0"/>
-              <a:t>19.11.2025.</a:t>
+              <a:t>20.11.2025.</a:t>
             </a:fld>
             <a:endParaRPr lang="hr-HR"/>
           </a:p>
@@ -2621,7 +2789,7 @@
           <a:p>
             <a:fld id="{F971FB43-724D-437A-A5E8-1D673BA80D2D}" type="datetimeFigureOut">
               <a:rPr lang="hr-HR" smtClean="0"/>
-              <a:t>19.11.2025.</a:t>
+              <a:t>20.11.2025.</a:t>
             </a:fld>
             <a:endParaRPr lang="hr-HR"/>
           </a:p>
@@ -2896,7 +3064,7 @@
           <a:p>
             <a:fld id="{F971FB43-724D-437A-A5E8-1D673BA80D2D}" type="datetimeFigureOut">
               <a:rPr lang="hr-HR" smtClean="0"/>
-              <a:t>19.11.2025.</a:t>
+              <a:t>20.11.2025.</a:t>
             </a:fld>
             <a:endParaRPr lang="hr-HR"/>
           </a:p>
@@ -3148,7 +3316,7 @@
           <a:p>
             <a:fld id="{F971FB43-724D-437A-A5E8-1D673BA80D2D}" type="datetimeFigureOut">
               <a:rPr lang="hr-HR" smtClean="0"/>
-              <a:t>19.11.2025.</a:t>
+              <a:t>20.11.2025.</a:t>
             </a:fld>
             <a:endParaRPr lang="hr-HR"/>
           </a:p>
@@ -3359,7 +3527,7 @@
           <a:p>
             <a:fld id="{F971FB43-724D-437A-A5E8-1D673BA80D2D}" type="datetimeFigureOut">
               <a:rPr lang="hr-HR" smtClean="0"/>
-              <a:t>19.11.2025.</a:t>
+              <a:t>20.11.2025.</a:t>
             </a:fld>
             <a:endParaRPr lang="hr-HR"/>
           </a:p>
@@ -5684,6 +5852,354 @@
           </a:prstGeom>
         </p:spPr>
       </p:pic>
+      <p:grpSp>
+        <p:nvGrpSpPr>
+          <p:cNvPr id="12" name="Grupa 11">
+            <a:extLst>
+              <a:ext uri="{FF2B5EF4-FFF2-40B4-BE49-F238E27FC236}">
+                <a16:creationId xmlns:a16="http://schemas.microsoft.com/office/drawing/2014/main" id="{32E14AD4-F882-621F-DD8E-6664DE3C101B}"/>
+              </a:ext>
+            </a:extLst>
+          </p:cNvPr>
+          <p:cNvGrpSpPr/>
+          <p:nvPr/>
+        </p:nvGrpSpPr>
+        <p:grpSpPr>
+          <a:xfrm>
+            <a:off x="1069690" y="1065845"/>
+            <a:ext cx="1000080" cy="2556360"/>
+            <a:chOff x="1069690" y="1065845"/>
+            <a:chExt cx="1000080" cy="2556360"/>
+          </a:xfrm>
+        </p:grpSpPr>
+        <mc:AlternateContent xmlns:mc="http://schemas.openxmlformats.org/markup-compatibility/2006">
+          <mc:Choice xmlns:p14="http://schemas.microsoft.com/office/powerpoint/2010/main" Requires="p14">
+            <p:contentPart p14:bwMode="auto" r:id="rId5">
+              <p14:nvContentPartPr>
+                <p14:cNvPr id="3" name="Rukopis 2">
+                  <a:extLst>
+                    <a:ext uri="{FF2B5EF4-FFF2-40B4-BE49-F238E27FC236}">
+                      <a16:creationId xmlns:a16="http://schemas.microsoft.com/office/drawing/2014/main" id="{7CBBA3D4-A6FF-65FA-ADE2-DD2C176E739C}"/>
+                    </a:ext>
+                  </a:extLst>
+                </p14:cNvPr>
+                <p14:cNvContentPartPr/>
+                <p14:nvPr/>
+              </p14:nvContentPartPr>
+              <p14:xfrm>
+                <a:off x="1497730" y="1065845"/>
+                <a:ext cx="478080" cy="576360"/>
+              </p14:xfrm>
+            </p:contentPart>
+          </mc:Choice>
+          <mc:Fallback>
+            <p:pic>
+              <p:nvPicPr>
+                <p:cNvPr id="3" name="Rukopis 2">
+                  <a:extLst>
+                    <a:ext uri="{FF2B5EF4-FFF2-40B4-BE49-F238E27FC236}">
+                      <a16:creationId xmlns:a16="http://schemas.microsoft.com/office/drawing/2014/main" id="{7CBBA3D4-A6FF-65FA-ADE2-DD2C176E739C}"/>
+                    </a:ext>
+                  </a:extLst>
+                </p:cNvPr>
+                <p:cNvPicPr/>
+                <p:nvPr/>
+              </p:nvPicPr>
+              <p:blipFill>
+                <a:blip r:embed="rId6"/>
+                <a:stretch>
+                  <a:fillRect/>
+                </a:stretch>
+              </p:blipFill>
+              <p:spPr>
+                <a:xfrm>
+                  <a:off x="1489090" y="1057205"/>
+                  <a:ext cx="495720" cy="594000"/>
+                </a:xfrm>
+                <a:prstGeom prst="rect">
+                  <a:avLst/>
+                </a:prstGeom>
+              </p:spPr>
+            </p:pic>
+          </mc:Fallback>
+        </mc:AlternateContent>
+        <mc:AlternateContent xmlns:mc="http://schemas.openxmlformats.org/markup-compatibility/2006">
+          <mc:Choice xmlns:p14="http://schemas.microsoft.com/office/powerpoint/2010/main" Requires="p14">
+            <p:contentPart p14:bwMode="auto" r:id="rId7">
+              <p14:nvContentPartPr>
+                <p14:cNvPr id="4" name="Rukopis 3">
+                  <a:extLst>
+                    <a:ext uri="{FF2B5EF4-FFF2-40B4-BE49-F238E27FC236}">
+                      <a16:creationId xmlns:a16="http://schemas.microsoft.com/office/drawing/2014/main" id="{939DF303-61F4-D12D-B4F2-1084BDE67F1E}"/>
+                    </a:ext>
+                  </a:extLst>
+                </p14:cNvPr>
+                <p14:cNvContentPartPr/>
+                <p14:nvPr/>
+              </p14:nvContentPartPr>
+              <p14:xfrm>
+                <a:off x="1682770" y="1902485"/>
+                <a:ext cx="387000" cy="615960"/>
+              </p14:xfrm>
+            </p:contentPart>
+          </mc:Choice>
+          <mc:Fallback>
+            <p:pic>
+              <p:nvPicPr>
+                <p:cNvPr id="4" name="Rukopis 3">
+                  <a:extLst>
+                    <a:ext uri="{FF2B5EF4-FFF2-40B4-BE49-F238E27FC236}">
+                      <a16:creationId xmlns:a16="http://schemas.microsoft.com/office/drawing/2014/main" id="{939DF303-61F4-D12D-B4F2-1084BDE67F1E}"/>
+                    </a:ext>
+                  </a:extLst>
+                </p:cNvPr>
+                <p:cNvPicPr/>
+                <p:nvPr/>
+              </p:nvPicPr>
+              <p:blipFill>
+                <a:blip r:embed="rId8"/>
+                <a:stretch>
+                  <a:fillRect/>
+                </a:stretch>
+              </p:blipFill>
+              <p:spPr>
+                <a:xfrm>
+                  <a:off x="1673770" y="1893485"/>
+                  <a:ext cx="404640" cy="633600"/>
+                </a:xfrm>
+                <a:prstGeom prst="rect">
+                  <a:avLst/>
+                </a:prstGeom>
+              </p:spPr>
+            </p:pic>
+          </mc:Fallback>
+        </mc:AlternateContent>
+        <mc:AlternateContent xmlns:mc="http://schemas.openxmlformats.org/markup-compatibility/2006">
+          <mc:Choice xmlns:p14="http://schemas.microsoft.com/office/powerpoint/2010/main" Requires="p14">
+            <p:contentPart p14:bwMode="auto" r:id="rId9">
+              <p14:nvContentPartPr>
+                <p14:cNvPr id="6" name="Rukopis 5">
+                  <a:extLst>
+                    <a:ext uri="{FF2B5EF4-FFF2-40B4-BE49-F238E27FC236}">
+                      <a16:creationId xmlns:a16="http://schemas.microsoft.com/office/drawing/2014/main" id="{76992652-DCE6-5423-D91C-E4C6EF320916}"/>
+                    </a:ext>
+                  </a:extLst>
+                </p14:cNvPr>
+                <p14:cNvContentPartPr/>
+                <p14:nvPr/>
+              </p14:nvContentPartPr>
+              <p14:xfrm>
+                <a:off x="1069690" y="2054765"/>
+                <a:ext cx="382680" cy="668160"/>
+              </p14:xfrm>
+            </p:contentPart>
+          </mc:Choice>
+          <mc:Fallback>
+            <p:pic>
+              <p:nvPicPr>
+                <p:cNvPr id="6" name="Rukopis 5">
+                  <a:extLst>
+                    <a:ext uri="{FF2B5EF4-FFF2-40B4-BE49-F238E27FC236}">
+                      <a16:creationId xmlns:a16="http://schemas.microsoft.com/office/drawing/2014/main" id="{76992652-DCE6-5423-D91C-E4C6EF320916}"/>
+                    </a:ext>
+                  </a:extLst>
+                </p:cNvPr>
+                <p:cNvPicPr/>
+                <p:nvPr/>
+              </p:nvPicPr>
+              <p:blipFill>
+                <a:blip r:embed="rId10"/>
+                <a:stretch>
+                  <a:fillRect/>
+                </a:stretch>
+              </p:blipFill>
+              <p:spPr>
+                <a:xfrm>
+                  <a:off x="1060690" y="2046125"/>
+                  <a:ext cx="400320" cy="685800"/>
+                </a:xfrm>
+                <a:prstGeom prst="rect">
+                  <a:avLst/>
+                </a:prstGeom>
+              </p:spPr>
+            </p:pic>
+          </mc:Fallback>
+        </mc:AlternateContent>
+        <mc:AlternateContent xmlns:mc="http://schemas.openxmlformats.org/markup-compatibility/2006">
+          <mc:Choice xmlns:p14="http://schemas.microsoft.com/office/powerpoint/2010/main" Requires="p14">
+            <p:contentPart p14:bwMode="auto" r:id="rId11">
+              <p14:nvContentPartPr>
+                <p14:cNvPr id="11" name="Rukopis 10">
+                  <a:extLst>
+                    <a:ext uri="{FF2B5EF4-FFF2-40B4-BE49-F238E27FC236}">
+                      <a16:creationId xmlns:a16="http://schemas.microsoft.com/office/drawing/2014/main" id="{F74C1F07-50EF-D377-D69D-F48E27998A59}"/>
+                    </a:ext>
+                  </a:extLst>
+                </p14:cNvPr>
+                <p14:cNvContentPartPr/>
+                <p14:nvPr/>
+              </p14:nvContentPartPr>
+              <p14:xfrm>
+                <a:off x="1283890" y="2952245"/>
+                <a:ext cx="492840" cy="669960"/>
+              </p14:xfrm>
+            </p:contentPart>
+          </mc:Choice>
+          <mc:Fallback>
+            <p:pic>
+              <p:nvPicPr>
+                <p:cNvPr id="11" name="Rukopis 10">
+                  <a:extLst>
+                    <a:ext uri="{FF2B5EF4-FFF2-40B4-BE49-F238E27FC236}">
+                      <a16:creationId xmlns:a16="http://schemas.microsoft.com/office/drawing/2014/main" id="{F74C1F07-50EF-D377-D69D-F48E27998A59}"/>
+                    </a:ext>
+                  </a:extLst>
+                </p:cNvPr>
+                <p:cNvPicPr/>
+                <p:nvPr/>
+              </p:nvPicPr>
+              <p:blipFill>
+                <a:blip r:embed="rId12"/>
+                <a:stretch>
+                  <a:fillRect/>
+                </a:stretch>
+              </p:blipFill>
+              <p:spPr>
+                <a:xfrm>
+                  <a:off x="1274890" y="2943245"/>
+                  <a:ext cx="510480" cy="687600"/>
+                </a:xfrm>
+                <a:prstGeom prst="rect">
+                  <a:avLst/>
+                </a:prstGeom>
+              </p:spPr>
+            </p:pic>
+          </mc:Fallback>
+        </mc:AlternateContent>
+      </p:grpSp>
+      <p:grpSp>
+        <p:nvGrpSpPr>
+          <p:cNvPr id="15" name="Grupa 14">
+            <a:extLst>
+              <a:ext uri="{FF2B5EF4-FFF2-40B4-BE49-F238E27FC236}">
+                <a16:creationId xmlns:a16="http://schemas.microsoft.com/office/drawing/2014/main" id="{7CC34747-1B2A-6421-A02E-EEBDDD8BB00F}"/>
+              </a:ext>
+            </a:extLst>
+          </p:cNvPr>
+          <p:cNvGrpSpPr/>
+          <p:nvPr/>
+        </p:nvGrpSpPr>
+        <p:grpSpPr>
+          <a:xfrm>
+            <a:off x="6789370" y="436205"/>
+            <a:ext cx="496440" cy="605520"/>
+            <a:chOff x="6789370" y="436205"/>
+            <a:chExt cx="496440" cy="605520"/>
+          </a:xfrm>
+        </p:grpSpPr>
+        <mc:AlternateContent xmlns:mc="http://schemas.openxmlformats.org/markup-compatibility/2006">
+          <mc:Choice xmlns:p14="http://schemas.microsoft.com/office/powerpoint/2010/main" Requires="p14">
+            <p:contentPart p14:bwMode="auto" r:id="rId13">
+              <p14:nvContentPartPr>
+                <p14:cNvPr id="13" name="Rukopis 12">
+                  <a:extLst>
+                    <a:ext uri="{FF2B5EF4-FFF2-40B4-BE49-F238E27FC236}">
+                      <a16:creationId xmlns:a16="http://schemas.microsoft.com/office/drawing/2014/main" id="{466BF5D5-8E84-F74C-2DB9-CAF9A9014DBD}"/>
+                    </a:ext>
+                  </a:extLst>
+                </p14:cNvPr>
+                <p14:cNvContentPartPr/>
+                <p14:nvPr/>
+              </p14:nvContentPartPr>
+              <p14:xfrm>
+                <a:off x="6789370" y="467165"/>
+                <a:ext cx="387720" cy="559440"/>
+              </p14:xfrm>
+            </p:contentPart>
+          </mc:Choice>
+          <mc:Fallback>
+            <p:pic>
+              <p:nvPicPr>
+                <p:cNvPr id="13" name="Rukopis 12">
+                  <a:extLst>
+                    <a:ext uri="{FF2B5EF4-FFF2-40B4-BE49-F238E27FC236}">
+                      <a16:creationId xmlns:a16="http://schemas.microsoft.com/office/drawing/2014/main" id="{466BF5D5-8E84-F74C-2DB9-CAF9A9014DBD}"/>
+                    </a:ext>
+                  </a:extLst>
+                </p:cNvPr>
+                <p:cNvPicPr/>
+                <p:nvPr/>
+              </p:nvPicPr>
+              <p:blipFill>
+                <a:blip r:embed="rId14"/>
+                <a:stretch>
+                  <a:fillRect/>
+                </a:stretch>
+              </p:blipFill>
+              <p:spPr>
+                <a:xfrm>
+                  <a:off x="6780730" y="458525"/>
+                  <a:ext cx="405360" cy="577080"/>
+                </a:xfrm>
+                <a:prstGeom prst="rect">
+                  <a:avLst/>
+                </a:prstGeom>
+              </p:spPr>
+            </p:pic>
+          </mc:Fallback>
+        </mc:AlternateContent>
+        <mc:AlternateContent xmlns:mc="http://schemas.openxmlformats.org/markup-compatibility/2006">
+          <mc:Choice xmlns:p14="http://schemas.microsoft.com/office/powerpoint/2010/main" Requires="p14">
+            <p:contentPart p14:bwMode="auto" r:id="rId15">
+              <p14:nvContentPartPr>
+                <p14:cNvPr id="14" name="Rukopis 13">
+                  <a:extLst>
+                    <a:ext uri="{FF2B5EF4-FFF2-40B4-BE49-F238E27FC236}">
+                      <a16:creationId xmlns:a16="http://schemas.microsoft.com/office/drawing/2014/main" id="{D1490D2D-27CE-DE4C-7B5B-F86CFBD2D4EE}"/>
+                    </a:ext>
+                  </a:extLst>
+                </p14:cNvPr>
+                <p14:cNvContentPartPr/>
+                <p14:nvPr/>
+              </p14:nvContentPartPr>
+              <p14:xfrm>
+                <a:off x="6915730" y="436205"/>
+                <a:ext cx="370080" cy="605520"/>
+              </p14:xfrm>
+            </p:contentPart>
+          </mc:Choice>
+          <mc:Fallback>
+            <p:pic>
+              <p:nvPicPr>
+                <p:cNvPr id="14" name="Rukopis 13">
+                  <a:extLst>
+                    <a:ext uri="{FF2B5EF4-FFF2-40B4-BE49-F238E27FC236}">
+                      <a16:creationId xmlns:a16="http://schemas.microsoft.com/office/drawing/2014/main" id="{D1490D2D-27CE-DE4C-7B5B-F86CFBD2D4EE}"/>
+                    </a:ext>
+                  </a:extLst>
+                </p:cNvPr>
+                <p:cNvPicPr/>
+                <p:nvPr/>
+              </p:nvPicPr>
+              <p:blipFill>
+                <a:blip r:embed="rId16"/>
+                <a:stretch>
+                  <a:fillRect/>
+                </a:stretch>
+              </p:blipFill>
+              <p:spPr>
+                <a:xfrm>
+                  <a:off x="6907090" y="427205"/>
+                  <a:ext cx="387720" cy="623160"/>
+                </a:xfrm>
+                <a:prstGeom prst="rect">
+                  <a:avLst/>
+                </a:prstGeom>
+              </p:spPr>
+            </p:pic>
+          </mc:Fallback>
+        </mc:AlternateContent>
+      </p:grpSp>
     </p:spTree>
     <p:extLst>
       <p:ext uri="{BB962C8B-B14F-4D97-AF65-F5344CB8AC3E}">

</xml_diff>

<commit_message>
Gotov team stats graf
</commit_message>
<xml_diff>
--- a/presentations/1_mockup_presentation.pptx
+++ b/presentations/1_mockup_presentation.pptx
@@ -383,6 +383,286 @@
 </p188:cmLst>
 </file>
 
+<file path=ppt/ink/ink1.xml><?xml version="1.0" encoding="utf-8"?>
+<inkml:ink xmlns:inkml="http://www.w3.org/2003/InkML">
+  <inkml:definitions>
+    <inkml:context xml:id="ctx0">
+      <inkml:inkSource xml:id="inkSrc0">
+        <inkml:traceFormat>
+          <inkml:channel name="X" type="integer" min="-2.14748E9" max="2.14748E9" units="cm"/>
+          <inkml:channel name="Y" type="integer" min="-2.14748E9" max="2.14748E9" units="cm"/>
+          <inkml:channel name="F" type="integer" max="32767" units="dev"/>
+        </inkml:traceFormat>
+        <inkml:channelProperties>
+          <inkml:channelProperty channel="X" name="resolution" value="1000" units="1/cm"/>
+          <inkml:channelProperty channel="Y" name="resolution" value="1000" units="1/cm"/>
+          <inkml:channelProperty channel="F" name="resolution" value="0" units="1/dev"/>
+        </inkml:channelProperties>
+      </inkml:inkSource>
+      <inkml:timestamp xml:id="ts0" timeString="2025-11-19T20:15:03.499"/>
+    </inkml:context>
+    <inkml:brush xml:id="br0">
+      <inkml:brushProperty name="width" value="0.05" units="cm"/>
+      <inkml:brushProperty name="height" value="0.05" units="cm"/>
+      <inkml:brushProperty name="color" value="#E71224"/>
+    </inkml:brush>
+  </inkml:definitions>
+  <inkml:trace contextRef="#ctx0" brushRef="#br0">2 1188 24575,'0'30'0,"-1"-13"0,1 1 0,4 25 0,-3-37 0,0-1 0,0 1 0,1-1 0,0 1 0,0-1 0,0 0 0,1 0 0,0 0 0,0 0 0,0-1 0,7 9 0,-7-11 0,-2 0 0,0-1 0,0 1 0,0-1 0,0 1 0,1-1 0,-1 0 0,1 0 0,-1 0 0,1 0 0,-1 0 0,1 0 0,-1 0 0,1 0 0,0 0 0,2 0 0,-3-2 0,1 0 0,0 0 0,0 0 0,-1 0 0,1 0 0,-1-1 0,1 1 0,-1 0 0,1-1 0,-1 1 0,0-1 0,0 1 0,0-1 0,0 0 0,0 0 0,0 1 0,0-1 0,0-2 0,67-132 0,10-18 0,144-177 0,28 17 0,46-61 0,-264 337-1365,-20 28-5461</inkml:trace>
+</inkml:ink>
+</file>
+
+<file path=ppt/ink/ink10.xml><?xml version="1.0" encoding="utf-8"?>
+<inkml:ink xmlns:inkml="http://www.w3.org/2003/InkML">
+  <inkml:definitions>
+    <inkml:context xml:id="ctx0">
+      <inkml:inkSource xml:id="inkSrc0">
+        <inkml:traceFormat>
+          <inkml:channel name="X" type="integer" min="-2.14748E9" max="2.14748E9" units="cm"/>
+          <inkml:channel name="Y" type="integer" min="-2.14748E9" max="2.14748E9" units="cm"/>
+          <inkml:channel name="F" type="integer" max="32767" units="dev"/>
+        </inkml:traceFormat>
+        <inkml:channelProperties>
+          <inkml:channelProperty channel="X" name="resolution" value="1000" units="1/cm"/>
+          <inkml:channelProperty channel="Y" name="resolution" value="1000" units="1/cm"/>
+          <inkml:channelProperty channel="F" name="resolution" value="0" units="1/dev"/>
+        </inkml:channelProperties>
+      </inkml:inkSource>
+      <inkml:timestamp xml:id="ts0" timeString="2025-11-20T13:24:10.773"/>
+    </inkml:context>
+    <inkml:brush xml:id="br0">
+      <inkml:brushProperty name="width" value="0.05" units="cm"/>
+      <inkml:brushProperty name="height" value="0.05" units="cm"/>
+      <inkml:brushProperty name="color" value="#E71224"/>
+    </inkml:brush>
+  </inkml:definitions>
+  <inkml:trace contextRef="#ctx0" brushRef="#br0">1 976 24575,'1'1'0,"1"0"0,-1 0 0,0-1 0,1 1 0,-1 1 0,0-1 0,0 0 0,0 0 0,0 0 0,0 1 0,0-1 0,0 0 0,0 1 0,-1-1 0,1 1 0,0-1 0,-1 1 0,1 2 0,2 3 0,14 32 0,20 79 0,-25-77 0,32 79 0,68 83 0,-60-114 0,-47-77 0,-2-6 0,0 0 0,1 1 0,-1-2 0,1 1 0,5 6 0,-8-11 0,0 0 0,-1-1 0,1 1 0,0 0 0,0-1 0,-1 1 0,1-1 0,0 1 0,0-1 0,0 1 0,0-1 0,0 0 0,-1 0 0,1 1 0,0-1 0,0 0 0,0 0 0,0 0 0,0 0 0,0 0 0,0 0 0,0 0 0,0 0 0,0 0 0,0 0 0,0-1 0,0 1 0,0 0 0,-1-1 0,1 1 0,0-1 0,0 1 0,0-1 0,0 1 0,-1-1 0,1 1 0,0-1 0,-1 0 0,1 1 0,0-1 0,-1 0 0,1 0 0,-1 0 0,1 1 0,0-3 0,15-23 0,-1-1 0,-1 0 0,-1-1 0,11-36 0,-7 21 0,487-1259-1365,-445 1152-5461</inkml:trace>
+</inkml:ink>
+</file>
+
+<file path=ppt/ink/ink2.xml><?xml version="1.0" encoding="utf-8"?>
+<inkml:ink xmlns:inkml="http://www.w3.org/2003/InkML">
+  <inkml:definitions>
+    <inkml:context xml:id="ctx0">
+      <inkml:inkSource xml:id="inkSrc0">
+        <inkml:traceFormat>
+          <inkml:channel name="X" type="integer" min="-2.14748E9" max="2.14748E9" units="cm"/>
+          <inkml:channel name="Y" type="integer" min="-2.14748E9" max="2.14748E9" units="cm"/>
+          <inkml:channel name="F" type="integer" max="32767" units="dev"/>
+        </inkml:traceFormat>
+        <inkml:channelProperties>
+          <inkml:channelProperty channel="X" name="resolution" value="1000" units="1/cm"/>
+          <inkml:channelProperty channel="Y" name="resolution" value="1000" units="1/cm"/>
+          <inkml:channelProperty channel="F" name="resolution" value="0" units="1/dev"/>
+        </inkml:channelProperties>
+      </inkml:inkSource>
+      <inkml:timestamp xml:id="ts0" timeString="2025-11-19T20:15:07.226"/>
+    </inkml:context>
+    <inkml:brush xml:id="br0">
+      <inkml:brushProperty name="width" value="0.05" units="cm"/>
+      <inkml:brushProperty name="height" value="0.05" units="cm"/>
+      <inkml:brushProperty name="color" value="#E71224"/>
+    </inkml:brush>
+  </inkml:definitions>
+  <inkml:trace contextRef="#ctx0" brushRef="#br0">0 1142 24575,'17'44'0,"10"42"0,70 194 0,-96-279 0,-1 0 0,1 0 0,0 0 0,-1 0 0,1 0 0,0 0 0,0 0 0,0 0 0,0-1 0,0 1 0,0 0 0,0 0 0,0-1 0,0 1 0,0-1 0,0 1 0,0-1 0,0 1 0,0-1 0,0 0 0,1 1 0,-1-1 0,0 0 0,0 0 0,1 0 0,-1 0 0,0 0 0,0 0 0,0 0 0,1 0 0,-1-1 0,0 1 0,0 0 0,0-1 0,2 0 0,7-3 0,1-1 0,-2 1 0,14-9 0,-12 6 0,321-220 36,-9-36-389,-264 214 110,931-793-3366,-822 692-413</inkml:trace>
+</inkml:ink>
+</file>
+
+<file path=ppt/ink/ink3.xml><?xml version="1.0" encoding="utf-8"?>
+<inkml:ink xmlns:inkml="http://www.w3.org/2003/InkML">
+  <inkml:definitions>
+    <inkml:context xml:id="ctx0">
+      <inkml:inkSource xml:id="inkSrc0">
+        <inkml:traceFormat>
+          <inkml:channel name="X" type="integer" min="-2.14748E9" max="2.14748E9" units="cm"/>
+          <inkml:channel name="Y" type="integer" min="-2.14748E9" max="2.14748E9" units="cm"/>
+          <inkml:channel name="F" type="integer" max="32767" units="dev"/>
+        </inkml:traceFormat>
+        <inkml:channelProperties>
+          <inkml:channelProperty channel="X" name="resolution" value="1000" units="1/cm"/>
+          <inkml:channelProperty channel="Y" name="resolution" value="1000" units="1/cm"/>
+          <inkml:channelProperty channel="F" name="resolution" value="0" units="1/dev"/>
+        </inkml:channelProperties>
+      </inkml:inkSource>
+      <inkml:timestamp xml:id="ts0" timeString="2025-11-19T20:15:15.116"/>
+    </inkml:context>
+    <inkml:brush xml:id="br0">
+      <inkml:brushProperty name="width" value="0.05" units="cm"/>
+      <inkml:brushProperty name="height" value="0.05" units="cm"/>
+      <inkml:brushProperty name="color" value="#E71224"/>
+    </inkml:brush>
+  </inkml:definitions>
+  <inkml:trace contextRef="#ctx0" brushRef="#br0">0 410 24575,'1'9'0,"0"0"0,1 0 0,0 0 0,1 0 0,6 15 0,3 14 0,-10-30 0,8 30 0,-2 0 0,-1 1 0,2 55 0,-7-55 0,8 45 0,-3-34 0,0-32 0,-7-18 0,0 0 0,1 0 0,-1 0 0,0 1 0,1-1 0,-1 0 0,0 0 0,1 0 0,-1 0 0,0 0 0,1 1 0,-1-1 0,0 0 0,1 0 0,-1 0 0,1 0 0,-1 0 0,0 0 0,1-1 0,-1 1 0,0 0 0,1 0 0,-1 0 0,1 0 0,-1 0 0,0 0 0,1-1 0,-1 1 0,4-3 0,-1 1 0,0-1 0,0 0 0,0 0 0,-1-1 0,1 1 0,3-7 0,35-60 0,55-134 0,-66 135 0,129-302-1365,-85 192-5461</inkml:trace>
+</inkml:ink>
+</file>
+
+<file path=ppt/ink/ink4.xml><?xml version="1.0" encoding="utf-8"?>
+<inkml:ink xmlns:inkml="http://www.w3.org/2003/InkML">
+  <inkml:definitions>
+    <inkml:context xml:id="ctx0">
+      <inkml:inkSource xml:id="inkSrc0">
+        <inkml:traceFormat>
+          <inkml:channel name="X" type="integer" min="-2.14748E9" max="2.14748E9" units="cm"/>
+          <inkml:channel name="Y" type="integer" min="-2.14748E9" max="2.14748E9" units="cm"/>
+          <inkml:channel name="F" type="integer" max="32767" units="dev"/>
+        </inkml:traceFormat>
+        <inkml:channelProperties>
+          <inkml:channelProperty channel="X" name="resolution" value="1000" units="1/cm"/>
+          <inkml:channelProperty channel="Y" name="resolution" value="1000" units="1/cm"/>
+          <inkml:channelProperty channel="F" name="resolution" value="0" units="1/dev"/>
+        </inkml:channelProperties>
+      </inkml:inkSource>
+      <inkml:timestamp xml:id="ts0" timeString="2025-11-19T20:41:03.398"/>
+    </inkml:context>
+    <inkml:brush xml:id="br0">
+      <inkml:brushProperty name="width" value="0.05" units="cm"/>
+      <inkml:brushProperty name="height" value="0.05" units="cm"/>
+      <inkml:brushProperty name="color" value="#E71224"/>
+    </inkml:brush>
+  </inkml:definitions>
+  <inkml:trace contextRef="#ctx0" brushRef="#br0">0 853 24575,'4'5'0,"-1"1"0,0-1 0,-1 0 0,1 1 0,-1 0 0,0 0 0,0 0 0,1 8 0,5 14 0,15 33 0,-3-12 0,-3 0 0,20 88 0,-37-136 0,0 1 0,0 0 0,0-1 0,1 1 0,-1-1 0,0 1 0,1-1 0,0 1 0,-1-1 0,1 0 0,0 1 0,-1-1 0,1 0 0,0 1 0,0-1 0,0 0 0,0 0 0,0 0 0,1 0 0,1 2 0,-2-3 0,0 0 0,0 0 0,0 0 0,0 0 0,0 0 0,0 0 0,1 0 0,-1 0 0,0 0 0,0 0 0,0-1 0,0 1 0,0-1 0,0 1 0,0 0 0,0-1 0,0 0 0,0 1 0,0-1 0,0 0 0,1 0 0,6-6 0,-1-1 0,1 0 0,-1 0 0,9-15 0,25-46 0,-2-1 0,33-88 0,-40 85 0,246-604 0,-239 544-1365,-34 108-5461</inkml:trace>
+</inkml:ink>
+</file>
+
+<file path=ppt/ink/ink5.xml><?xml version="1.0" encoding="utf-8"?>
+<inkml:ink xmlns:inkml="http://www.w3.org/2003/InkML">
+  <inkml:definitions>
+    <inkml:context xml:id="ctx0">
+      <inkml:inkSource xml:id="inkSrc0">
+        <inkml:traceFormat>
+          <inkml:channel name="X" type="integer" min="-2.14748E9" max="2.14748E9" units="cm"/>
+          <inkml:channel name="Y" type="integer" min="-2.14748E9" max="2.14748E9" units="cm"/>
+          <inkml:channel name="F" type="integer" max="32767" units="dev"/>
+        </inkml:traceFormat>
+        <inkml:channelProperties>
+          <inkml:channelProperty channel="X" name="resolution" value="1000" units="1/cm"/>
+          <inkml:channelProperty channel="Y" name="resolution" value="1000" units="1/cm"/>
+          <inkml:channelProperty channel="F" name="resolution" value="0" units="1/dev"/>
+        </inkml:channelProperties>
+      </inkml:inkSource>
+      <inkml:timestamp xml:id="ts0" timeString="2025-11-20T13:23:58.313"/>
+    </inkml:context>
+    <inkml:brush xml:id="br0">
+      <inkml:brushProperty name="width" value="0.05" units="cm"/>
+      <inkml:brushProperty name="height" value="0.05" units="cm"/>
+      <inkml:brushProperty name="color" value="#E71224"/>
+    </inkml:brush>
+  </inkml:definitions>
+  <inkml:trace contextRef="#ctx0" brushRef="#br0">1 1281 24575,'1'0'0,"0"1"0,0-1 0,0 0 0,0 1 0,-1-1 0,1 0 0,0 1 0,0-1 0,0 1 0,0 0 0,-1-1 0,1 1 0,0 0 0,-1-1 0,1 1 0,0 0 0,-1 0 0,1 0 0,-1-1 0,1 1 0,-1 0 0,0 0 0,1 0 0,-1 1 0,9 31 0,-5-20 0,8 20 0,31 56 0,5 9 0,-46-92 0,9 18 0,-10-24 0,-1 1 0,1-1 0,0 1 0,-1 0 0,1-1 0,-1 1 0,1-1 0,0 0 0,0 1 0,-1-1 0,1 1 0,0-1 0,0 0 0,0 0 0,-1 0 0,1 1 0,0-1 0,0 0 0,0 0 0,-1 0 0,1 0 0,0 0 0,0 0 0,0 0 0,0-1 0,-1 1 0,1 0 0,0 0 0,0-1 0,1 0 0,7-5 0,0 0 0,0-1 0,-1-1 0,0 1 0,0-1 0,-1-1 0,0 1 0,11-18 0,1 0 0,494-721 0,-273 384 0,-182 276 0,95-130 0,-145 208-227,1 0-1,-1 0 1,1 1-1,1 0 1,11-8-1,4 3-6598</inkml:trace>
+</inkml:ink>
+</file>
+
+<file path=ppt/ink/ink6.xml><?xml version="1.0" encoding="utf-8"?>
+<inkml:ink xmlns:inkml="http://www.w3.org/2003/InkML">
+  <inkml:definitions>
+    <inkml:context xml:id="ctx0">
+      <inkml:inkSource xml:id="inkSrc0">
+        <inkml:traceFormat>
+          <inkml:channel name="X" type="integer" min="-2.14748E9" max="2.14748E9" units="cm"/>
+          <inkml:channel name="Y" type="integer" min="-2.14748E9" max="2.14748E9" units="cm"/>
+          <inkml:channel name="F" type="integer" max="32767" units="dev"/>
+        </inkml:traceFormat>
+        <inkml:channelProperties>
+          <inkml:channelProperty channel="X" name="resolution" value="1000" units="1/cm"/>
+          <inkml:channelProperty channel="Y" name="resolution" value="1000" units="1/cm"/>
+          <inkml:channelProperty channel="F" name="resolution" value="0" units="1/dev"/>
+        </inkml:channelProperties>
+      </inkml:inkSource>
+      <inkml:timestamp xml:id="ts0" timeString="2025-11-20T13:24:00.767"/>
+    </inkml:context>
+    <inkml:brush xml:id="br0">
+      <inkml:brushProperty name="width" value="0.05" units="cm"/>
+      <inkml:brushProperty name="height" value="0.05" units="cm"/>
+      <inkml:brushProperty name="color" value="#E71224"/>
+    </inkml:brush>
+  </inkml:definitions>
+  <inkml:trace contextRef="#ctx0" brushRef="#br0">0 1551 24575,'10'39'0,"-6"-24"0,-1 0 0,2 0 0,6 14 0,-9-26 0,-1 0 0,1 0 0,-1 0 0,1 0 0,0 0 0,0-1 0,0 1 0,1 0 0,-1-1 0,1 0 0,-1 0 0,1 0 0,0 0 0,0 0 0,0 0 0,0-1 0,0 1 0,6 1 0,-6-3 0,0 0 0,0 0 0,0 0 0,0 0 0,0 0 0,0-1 0,0 1 0,-1-1 0,1 0 0,0 0 0,0 0 0,0 0 0,-1 0 0,1-1 0,-1 1 0,1-1 0,-1 0 0,1 1 0,3-5 0,4-4 0,-1 0 0,15-21 0,63-104 0,-46 70 0,109-216 0,-78 139 0,436-816-1365,-478 901-5461</inkml:trace>
+</inkml:ink>
+</file>
+
+<file path=ppt/ink/ink7.xml><?xml version="1.0" encoding="utf-8"?>
+<inkml:ink xmlns:inkml="http://www.w3.org/2003/InkML">
+  <inkml:definitions>
+    <inkml:context xml:id="ctx0">
+      <inkml:inkSource xml:id="inkSrc0">
+        <inkml:traceFormat>
+          <inkml:channel name="X" type="integer" min="-2.14748E9" max="2.14748E9" units="cm"/>
+          <inkml:channel name="Y" type="integer" min="-2.14748E9" max="2.14748E9" units="cm"/>
+          <inkml:channel name="F" type="integer" max="32767" units="dev"/>
+        </inkml:traceFormat>
+        <inkml:channelProperties>
+          <inkml:channelProperty channel="X" name="resolution" value="1000" units="1/cm"/>
+          <inkml:channelProperty channel="Y" name="resolution" value="1000" units="1/cm"/>
+          <inkml:channelProperty channel="F" name="resolution" value="0" units="1/dev"/>
+        </inkml:channelProperties>
+      </inkml:inkSource>
+      <inkml:timestamp xml:id="ts0" timeString="2025-11-20T13:24:01.705"/>
+    </inkml:context>
+    <inkml:brush xml:id="br0">
+      <inkml:brushProperty name="width" value="0.05" units="cm"/>
+      <inkml:brushProperty name="height" value="0.05" units="cm"/>
+      <inkml:brushProperty name="color" value="#E71224"/>
+    </inkml:brush>
+  </inkml:definitions>
+  <inkml:trace contextRef="#ctx0" brushRef="#br0">0 1506 24575,'2'16'0,"1"0"0,0 0 0,1-1 0,0 1 0,2-1 0,0 0 0,9 17 0,-1 0 0,-7-14 0,1 0 0,0-1 0,1-1 0,0 1 0,2-1 0,0-1 0,0 0 0,15 13 0,-24-26 0,0 0 0,0-1 0,0 1 0,0-1 0,1 1 0,-1-1 0,0 0 0,1 0 0,-1 0 0,1 0 0,-1-1 0,1 1 0,-1-1 0,1 1 0,0-1 0,-1 0 0,1 0 0,0 0 0,-1 0 0,1-1 0,-1 1 0,1-1 0,-1 1 0,1-1 0,-1 0 0,1 0 0,-1 0 0,1 0 0,-1-1 0,0 1 0,0-1 0,0 1 0,3-3 0,5-5 0,-1-1 0,1-1 0,-2 1 0,1-1 0,6-13 0,-15 24 0,57-97 0,-5-3 0,49-127 0,-60 129 0,307-744 0,-263 628-1365,-9 29-5461</inkml:trace>
+</inkml:ink>
+</file>
+
+<file path=ppt/ink/ink8.xml><?xml version="1.0" encoding="utf-8"?>
+<inkml:ink xmlns:inkml="http://www.w3.org/2003/InkML">
+  <inkml:definitions>
+    <inkml:context xml:id="ctx0">
+      <inkml:inkSource xml:id="inkSrc0">
+        <inkml:traceFormat>
+          <inkml:channel name="X" type="integer" min="-2.14748E9" max="2.14748E9" units="cm"/>
+          <inkml:channel name="Y" type="integer" min="-2.14748E9" max="2.14748E9" units="cm"/>
+          <inkml:channel name="F" type="integer" max="32767" units="dev"/>
+        </inkml:traceFormat>
+        <inkml:channelProperties>
+          <inkml:channelProperty channel="X" name="resolution" value="1000" units="1/cm"/>
+          <inkml:channelProperty channel="Y" name="resolution" value="1000" units="1/cm"/>
+          <inkml:channelProperty channel="F" name="resolution" value="0" units="1/dev"/>
+        </inkml:channelProperties>
+      </inkml:inkSource>
+      <inkml:timestamp xml:id="ts0" timeString="2025-11-20T13:24:03.689"/>
+    </inkml:context>
+    <inkml:brush xml:id="br0">
+      <inkml:brushProperty name="width" value="0.05" units="cm"/>
+      <inkml:brushProperty name="height" value="0.05" units="cm"/>
+      <inkml:brushProperty name="color" value="#E71224"/>
+    </inkml:brush>
+  </inkml:definitions>
+  <inkml:trace contextRef="#ctx0" brushRef="#br0">0 1500 24575,'2'24'0,"2"0"0,0 0 0,2 0 0,1 0 0,0-1 0,13 25 0,-7-13 0,33 93 0,-46-128 0,0 0 0,0 1 0,0-1 0,0 0 0,0 0 0,0 1 0,0-1 0,0 0 0,0 1 0,0-1 0,1 0 0,-1 0 0,0 1 0,0-1 0,0 0 0,1 0 0,-1 1 0,0-1 0,0 0 0,0 0 0,1 0 0,-1 1 0,0-1 0,1 0 0,-1 0 0,0 0 0,0 0 0,1 0 0,-1 1 0,0-1 0,1 0 0,-1 0 0,0 0 0,1 0 0,-1 0 0,0 0 0,1 0 0,11-10 0,14-27 0,-22 30 0,58-101 0,56-134 0,-42 78 0,10-3 0,7 4 0,7 4 0,7 5 0,153-170 0,-99 149-1365,-15 24-5461</inkml:trace>
+</inkml:ink>
+</file>
+
+<file path=ppt/ink/ink9.xml><?xml version="1.0" encoding="utf-8"?>
+<inkml:ink xmlns:inkml="http://www.w3.org/2003/InkML">
+  <inkml:definitions>
+    <inkml:context xml:id="ctx0">
+      <inkml:inkSource xml:id="inkSrc0">
+        <inkml:traceFormat>
+          <inkml:channel name="X" type="integer" min="-2.14748E9" max="2.14748E9" units="cm"/>
+          <inkml:channel name="Y" type="integer" min="-2.14748E9" max="2.14748E9" units="cm"/>
+          <inkml:channel name="F" type="integer" max="32767" units="dev"/>
+        </inkml:traceFormat>
+        <inkml:channelProperties>
+          <inkml:channelProperty channel="X" name="resolution" value="1000" units="1/cm"/>
+          <inkml:channelProperty channel="Y" name="resolution" value="1000" units="1/cm"/>
+          <inkml:channelProperty channel="F" name="resolution" value="0" units="1/dev"/>
+        </inkml:channelProperties>
+      </inkml:inkSource>
+      <inkml:timestamp xml:id="ts0" timeString="2025-11-20T13:24:09.341"/>
+    </inkml:context>
+    <inkml:brush xml:id="br0">
+      <inkml:brushProperty name="width" value="0.05" units="cm"/>
+      <inkml:brushProperty name="height" value="0.05" units="cm"/>
+      <inkml:brushProperty name="color" value="#E71224"/>
+    </inkml:brush>
+  </inkml:definitions>
+  <inkml:trace contextRef="#ctx0" brushRef="#br0">1 836 24575,'0'5'0,"1"-1"0,0 1 0,1-1 0,-1 0 0,1 1 0,0-1 0,0 0 0,0 0 0,0 0 0,3 3 0,7 14 0,58 120 0,94 280 0,-161-408 0,-1-3 0,1 0 0,0 0 0,7 14 0,-10-23 0,0 0 0,1 0 0,-1 0 0,0-1 0,1 1 0,-1 0 0,1 0 0,-1 0 0,1 0 0,0-1 0,-1 1 0,1 0 0,0 0 0,-1-1 0,1 1 0,0 0 0,0-1 0,0 1 0,0-1 0,-1 1 0,1-1 0,0 0 0,0 1 0,0-1 0,0 0 0,0 0 0,0 0 0,0 1 0,0-1 0,0 0 0,0 0 0,0 0 0,0-1 0,0 1 0,0 0 0,0 0 0,0 0 0,0-1 0,0 1 0,0-1 0,0 1 0,0 0 0,1-2 0,2-1 0,0-1 0,0 1 0,0-1 0,0-1 0,-1 1 0,1 0 0,-1-1 0,4-8 0,21-49 0,-18 34 0,123-325 0,11-28 0,6 65 120,-107 240-863,102-137 1,-83 139-6084</inkml:trace>
+</inkml:ink>
+</file>
+
 <file path=ppt/notesMasters/notesMaster1.xml><?xml version="1.0" encoding="utf-8"?>
 <p:notesMaster xmlns:a="http://schemas.openxmlformats.org/drawingml/2006/main" xmlns:r="http://schemas.openxmlformats.org/officeDocument/2006/relationships" xmlns:p="http://schemas.openxmlformats.org/presentationml/2006/main">
   <p:cSld>
@@ -465,7 +745,7 @@
           <a:p>
             <a:fld id="{2139599A-F55A-43CD-BD42-27C7A89EA2FB}" type="datetimeFigureOut">
               <a:rPr lang="hr-HR" smtClean="0"/>
-              <a:t>20.10.2025.</a:t>
+              <a:t>20.11.2025.</a:t>
             </a:fld>
             <a:endParaRPr lang="hr-HR"/>
           </a:p>
@@ -945,7 +1225,7 @@
           <a:p>
             <a:fld id="{F971FB43-724D-437A-A5E8-1D673BA80D2D}" type="datetimeFigureOut">
               <a:rPr lang="hr-HR" smtClean="0"/>
-              <a:t>20.10.2025.</a:t>
+              <a:t>20.11.2025.</a:t>
             </a:fld>
             <a:endParaRPr lang="hr-HR"/>
           </a:p>
@@ -1113,7 +1393,7 @@
           <a:p>
             <a:fld id="{F971FB43-724D-437A-A5E8-1D673BA80D2D}" type="datetimeFigureOut">
               <a:rPr lang="hr-HR" smtClean="0"/>
-              <a:t>20.10.2025.</a:t>
+              <a:t>20.11.2025.</a:t>
             </a:fld>
             <a:endParaRPr lang="hr-HR"/>
           </a:p>
@@ -1291,7 +1571,7 @@
           <a:p>
             <a:fld id="{F971FB43-724D-437A-A5E8-1D673BA80D2D}" type="datetimeFigureOut">
               <a:rPr lang="hr-HR" smtClean="0"/>
-              <a:t>20.10.2025.</a:t>
+              <a:t>20.11.2025.</a:t>
             </a:fld>
             <a:endParaRPr lang="hr-HR"/>
           </a:p>
@@ -1459,7 +1739,7 @@
           <a:p>
             <a:fld id="{F971FB43-724D-437A-A5E8-1D673BA80D2D}" type="datetimeFigureOut">
               <a:rPr lang="hr-HR" smtClean="0"/>
-              <a:t>20.10.2025.</a:t>
+              <a:t>20.11.2025.</a:t>
             </a:fld>
             <a:endParaRPr lang="hr-HR"/>
           </a:p>
@@ -1704,7 +1984,7 @@
           <a:p>
             <a:fld id="{F971FB43-724D-437A-A5E8-1D673BA80D2D}" type="datetimeFigureOut">
               <a:rPr lang="hr-HR" smtClean="0"/>
-              <a:t>20.10.2025.</a:t>
+              <a:t>20.11.2025.</a:t>
             </a:fld>
             <a:endParaRPr lang="hr-HR"/>
           </a:p>
@@ -1933,7 +2213,7 @@
           <a:p>
             <a:fld id="{F971FB43-724D-437A-A5E8-1D673BA80D2D}" type="datetimeFigureOut">
               <a:rPr lang="hr-HR" smtClean="0"/>
-              <a:t>20.10.2025.</a:t>
+              <a:t>20.11.2025.</a:t>
             </a:fld>
             <a:endParaRPr lang="hr-HR"/>
           </a:p>
@@ -2297,7 +2577,7 @@
           <a:p>
             <a:fld id="{F971FB43-724D-437A-A5E8-1D673BA80D2D}" type="datetimeFigureOut">
               <a:rPr lang="hr-HR" smtClean="0"/>
-              <a:t>20.10.2025.</a:t>
+              <a:t>20.11.2025.</a:t>
             </a:fld>
             <a:endParaRPr lang="hr-HR"/>
           </a:p>
@@ -2414,7 +2694,7 @@
           <a:p>
             <a:fld id="{F971FB43-724D-437A-A5E8-1D673BA80D2D}" type="datetimeFigureOut">
               <a:rPr lang="hr-HR" smtClean="0"/>
-              <a:t>20.10.2025.</a:t>
+              <a:t>20.11.2025.</a:t>
             </a:fld>
             <a:endParaRPr lang="hr-HR"/>
           </a:p>
@@ -2509,7 +2789,7 @@
           <a:p>
             <a:fld id="{F971FB43-724D-437A-A5E8-1D673BA80D2D}" type="datetimeFigureOut">
               <a:rPr lang="hr-HR" smtClean="0"/>
-              <a:t>20.10.2025.</a:t>
+              <a:t>20.11.2025.</a:t>
             </a:fld>
             <a:endParaRPr lang="hr-HR"/>
           </a:p>
@@ -2784,7 +3064,7 @@
           <a:p>
             <a:fld id="{F971FB43-724D-437A-A5E8-1D673BA80D2D}" type="datetimeFigureOut">
               <a:rPr lang="hr-HR" smtClean="0"/>
-              <a:t>20.10.2025.</a:t>
+              <a:t>20.11.2025.</a:t>
             </a:fld>
             <a:endParaRPr lang="hr-HR"/>
           </a:p>
@@ -3036,7 +3316,7 @@
           <a:p>
             <a:fld id="{F971FB43-724D-437A-A5E8-1D673BA80D2D}" type="datetimeFigureOut">
               <a:rPr lang="hr-HR" smtClean="0"/>
-              <a:t>20.10.2025.</a:t>
+              <a:t>20.11.2025.</a:t>
             </a:fld>
             <a:endParaRPr lang="hr-HR"/>
           </a:p>
@@ -3247,7 +3527,7 @@
           <a:p>
             <a:fld id="{F971FB43-724D-437A-A5E8-1D673BA80D2D}" type="datetimeFigureOut">
               <a:rPr lang="hr-HR" smtClean="0"/>
-              <a:t>20.10.2025.</a:t>
+              <a:t>20.11.2025.</a:t>
             </a:fld>
             <a:endParaRPr lang="hr-HR"/>
           </a:p>
@@ -4529,7 +4809,7 @@
               <a:buAutoNum type="arabicPeriod"/>
             </a:pPr>
             <a:r>
-              <a:rPr lang="en-US" b="1">
+              <a:rPr lang="en-US" b="1" dirty="0">
                 <a:solidFill>
                   <a:schemeClr val="tx1">
                     <a:lumMod val="95000"/>
@@ -4865,6 +5145,245 @@
           </a:prstGeom>
         </p:spPr>
       </p:pic>
+      <mc:AlternateContent xmlns:mc="http://schemas.openxmlformats.org/markup-compatibility/2006" xmlns:p14="http://schemas.microsoft.com/office/powerpoint/2010/main">
+        <mc:Choice Requires="p14">
+          <p:contentPart p14:bwMode="auto" r:id="rId4">
+            <p14:nvContentPartPr>
+              <p14:cNvPr id="3" name="Rukopis 2">
+                <a:extLst>
+                  <a:ext uri="{FF2B5EF4-FFF2-40B4-BE49-F238E27FC236}">
+                    <a16:creationId xmlns:a16="http://schemas.microsoft.com/office/drawing/2014/main" id="{08DBEE57-2B5C-895C-719C-206A54125DA9}"/>
+                  </a:ext>
+                </a:extLst>
+              </p14:cNvPr>
+              <p14:cNvContentPartPr/>
+              <p14:nvPr/>
+            </p14:nvContentPartPr>
+            <p14:xfrm>
+              <a:off x="1728720" y="4083120"/>
+              <a:ext cx="377640" cy="499680"/>
+            </p14:xfrm>
+          </p:contentPart>
+        </mc:Choice>
+        <mc:Fallback xmlns="">
+          <p:pic>
+            <p:nvPicPr>
+              <p:cNvPr id="3" name="Rukopis 2">
+                <a:extLst>
+                  <a:ext uri="{FF2B5EF4-FFF2-40B4-BE49-F238E27FC236}">
+                    <a16:creationId xmlns:a16="http://schemas.microsoft.com/office/drawing/2014/main" id="{08DBEE57-2B5C-895C-719C-206A54125DA9}"/>
+                  </a:ext>
+                </a:extLst>
+              </p:cNvPr>
+              <p:cNvPicPr/>
+              <p:nvPr/>
+            </p:nvPicPr>
+            <p:blipFill>
+              <a:blip r:embed="rId5"/>
+              <a:stretch>
+                <a:fillRect/>
+              </a:stretch>
+            </p:blipFill>
+            <p:spPr>
+              <a:xfrm>
+                <a:off x="1720080" y="4074120"/>
+                <a:ext cx="395280" cy="517320"/>
+              </a:xfrm>
+              <a:prstGeom prst="rect">
+                <a:avLst/>
+              </a:prstGeom>
+            </p:spPr>
+          </p:pic>
+        </mc:Fallback>
+      </mc:AlternateContent>
+      <mc:AlternateContent xmlns:mc="http://schemas.openxmlformats.org/markup-compatibility/2006" xmlns:p14="http://schemas.microsoft.com/office/powerpoint/2010/main">
+        <mc:Choice Requires="p14">
+          <p:contentPart p14:bwMode="auto" r:id="rId6">
+            <p14:nvContentPartPr>
+              <p14:cNvPr id="4" name="Rukopis 3">
+                <a:extLst>
+                  <a:ext uri="{FF2B5EF4-FFF2-40B4-BE49-F238E27FC236}">
+                    <a16:creationId xmlns:a16="http://schemas.microsoft.com/office/drawing/2014/main" id="{BCFB1BA7-463E-FDEA-0BCA-B2938E318B23}"/>
+                  </a:ext>
+                </a:extLst>
+              </p14:cNvPr>
+              <p14:cNvContentPartPr/>
+              <p14:nvPr/>
+            </p14:nvContentPartPr>
+            <p14:xfrm>
+              <a:off x="1341000" y="1996560"/>
+              <a:ext cx="761760" cy="564840"/>
+            </p14:xfrm>
+          </p:contentPart>
+        </mc:Choice>
+        <mc:Fallback xmlns="">
+          <p:pic>
+            <p:nvPicPr>
+              <p:cNvPr id="4" name="Rukopis 3">
+                <a:extLst>
+                  <a:ext uri="{FF2B5EF4-FFF2-40B4-BE49-F238E27FC236}">
+                    <a16:creationId xmlns:a16="http://schemas.microsoft.com/office/drawing/2014/main" id="{BCFB1BA7-463E-FDEA-0BCA-B2938E318B23}"/>
+                  </a:ext>
+                </a:extLst>
+              </p:cNvPr>
+              <p:cNvPicPr/>
+              <p:nvPr/>
+            </p:nvPicPr>
+            <p:blipFill>
+              <a:blip r:embed="rId7"/>
+              <a:stretch>
+                <a:fillRect/>
+              </a:stretch>
+            </p:blipFill>
+            <p:spPr>
+              <a:xfrm>
+                <a:off x="1332000" y="1987920"/>
+                <a:ext cx="779400" cy="582480"/>
+              </a:xfrm>
+              <a:prstGeom prst="rect">
+                <a:avLst/>
+              </a:prstGeom>
+            </p:spPr>
+          </p:pic>
+        </mc:Fallback>
+      </mc:AlternateContent>
+      <mc:AlternateContent xmlns:mc="http://schemas.openxmlformats.org/markup-compatibility/2006" xmlns:p14="http://schemas.microsoft.com/office/powerpoint/2010/main">
+        <mc:Choice Requires="p14">
+          <p:contentPart p14:bwMode="auto" r:id="rId8">
+            <p14:nvContentPartPr>
+              <p14:cNvPr id="6" name="Rukopis 5">
+                <a:extLst>
+                  <a:ext uri="{FF2B5EF4-FFF2-40B4-BE49-F238E27FC236}">
+                    <a16:creationId xmlns:a16="http://schemas.microsoft.com/office/drawing/2014/main" id="{3AFB62BE-8A19-7111-FF40-FD6661DD6081}"/>
+                  </a:ext>
+                </a:extLst>
+              </p14:cNvPr>
+              <p14:cNvContentPartPr/>
+              <p14:nvPr/>
+            </p14:nvContentPartPr>
+            <p14:xfrm>
+              <a:off x="1508400" y="3258360"/>
+              <a:ext cx="190800" cy="333720"/>
+            </p14:xfrm>
+          </p:contentPart>
+        </mc:Choice>
+        <mc:Fallback xmlns="">
+          <p:pic>
+            <p:nvPicPr>
+              <p:cNvPr id="6" name="Rukopis 5">
+                <a:extLst>
+                  <a:ext uri="{FF2B5EF4-FFF2-40B4-BE49-F238E27FC236}">
+                    <a16:creationId xmlns:a16="http://schemas.microsoft.com/office/drawing/2014/main" id="{3AFB62BE-8A19-7111-FF40-FD6661DD6081}"/>
+                  </a:ext>
+                </a:extLst>
+              </p:cNvPr>
+              <p:cNvPicPr/>
+              <p:nvPr/>
+            </p:nvPicPr>
+            <p:blipFill>
+              <a:blip r:embed="rId9"/>
+              <a:stretch>
+                <a:fillRect/>
+              </a:stretch>
+            </p:blipFill>
+            <p:spPr>
+              <a:xfrm>
+                <a:off x="1499400" y="3249720"/>
+                <a:ext cx="208440" cy="351360"/>
+              </a:xfrm>
+              <a:prstGeom prst="rect">
+                <a:avLst/>
+              </a:prstGeom>
+            </p:spPr>
+          </p:pic>
+        </mc:Fallback>
+      </mc:AlternateContent>
+      <mc:AlternateContent xmlns:mc="http://schemas.openxmlformats.org/markup-compatibility/2006" xmlns:p14="http://schemas.microsoft.com/office/powerpoint/2010/main">
+        <mc:Choice Requires="p14">
+          <p:contentPart p14:bwMode="auto" r:id="rId10">
+            <p14:nvContentPartPr>
+              <p14:cNvPr id="7" name="Rukopis 6">
+                <a:extLst>
+                  <a:ext uri="{FF2B5EF4-FFF2-40B4-BE49-F238E27FC236}">
+                    <a16:creationId xmlns:a16="http://schemas.microsoft.com/office/drawing/2014/main" id="{7616EFFA-7C57-BD96-0B80-ECDDEC38E07A}"/>
+                  </a:ext>
+                </a:extLst>
+              </p14:cNvPr>
+              <p14:cNvContentPartPr/>
+              <p14:nvPr/>
+            </p14:nvContentPartPr>
+            <p14:xfrm>
+              <a:off x="1317960" y="1186200"/>
+              <a:ext cx="259920" cy="456120"/>
+            </p14:xfrm>
+          </p:contentPart>
+        </mc:Choice>
+        <mc:Fallback xmlns="">
+          <p:pic>
+            <p:nvPicPr>
+              <p:cNvPr id="7" name="Rukopis 6">
+                <a:extLst>
+                  <a:ext uri="{FF2B5EF4-FFF2-40B4-BE49-F238E27FC236}">
+                    <a16:creationId xmlns:a16="http://schemas.microsoft.com/office/drawing/2014/main" id="{7616EFFA-7C57-BD96-0B80-ECDDEC38E07A}"/>
+                  </a:ext>
+                </a:extLst>
+              </p:cNvPr>
+              <p:cNvPicPr/>
+              <p:nvPr/>
+            </p:nvPicPr>
+            <p:blipFill>
+              <a:blip r:embed="rId11"/>
+              <a:stretch>
+                <a:fillRect/>
+              </a:stretch>
+            </p:blipFill>
+            <p:spPr>
+              <a:xfrm>
+                <a:off x="1308960" y="1177200"/>
+                <a:ext cx="277560" cy="473760"/>
+              </a:xfrm>
+              <a:prstGeom prst="rect">
+                <a:avLst/>
+              </a:prstGeom>
+            </p:spPr>
+          </p:pic>
+        </mc:Fallback>
+      </mc:AlternateContent>
+      <p:sp>
+        <p:nvSpPr>
+          <p:cNvPr id="8" name="TekstniOkvir 7">
+            <a:extLst>
+              <a:ext uri="{FF2B5EF4-FFF2-40B4-BE49-F238E27FC236}">
+                <a16:creationId xmlns:a16="http://schemas.microsoft.com/office/drawing/2014/main" id="{CC9F95BF-A3CF-5AB1-97D4-290FB7A53B70}"/>
+              </a:ext>
+            </a:extLst>
+          </p:cNvPr>
+          <p:cNvSpPr txBox="1"/>
+          <p:nvPr/>
+        </p:nvSpPr>
+        <p:spPr>
+          <a:xfrm>
+            <a:off x="289560" y="4610624"/>
+            <a:ext cx="5654040" cy="369332"/>
+          </a:xfrm>
+          <a:prstGeom prst="rect">
+            <a:avLst/>
+          </a:prstGeom>
+          <a:noFill/>
+        </p:spPr>
+        <p:txBody>
+          <a:bodyPr wrap="square" rtlCol="0">
+            <a:spAutoFit/>
+          </a:bodyPr>
+          <a:lstStyle/>
+          <a:p>
+            <a:r>
+              <a:rPr lang="hr-HR" dirty="0"/>
+              <a:t>DODAJ FILTER ZA STATISTIKU, u smislu sta ide na y os</a:t>
+            </a:r>
+          </a:p>
+        </p:txBody>
+      </p:sp>
     </p:spTree>
     <p:extLst>
       <p:ext uri="{BB962C8B-B14F-4D97-AF65-F5344CB8AC3E}">
@@ -5062,7 +5581,7 @@
           <a:lstStyle/>
           <a:p>
             <a:r>
-              <a:rPr lang="en-US" b="1">
+              <a:rPr lang="en-US" b="1" dirty="0">
                 <a:solidFill>
                   <a:schemeClr val="tx1">
                     <a:lumMod val="95000"/>
@@ -5072,7 +5591,7 @@
               </a:rPr>
               <a:t>2.  Graph: player statistics</a:t>
             </a:r>
-            <a:endParaRPr lang="en-US">
+            <a:endParaRPr lang="en-US" dirty="0">
               <a:solidFill>
                 <a:schemeClr val="tx1">
                   <a:lumMod val="95000"/>
@@ -5082,7 +5601,7 @@
             </a:endParaRPr>
           </a:p>
           <a:p>
-            <a:endParaRPr lang="en-US"/>
+            <a:endParaRPr lang="en-US" dirty="0"/>
           </a:p>
         </p:txBody>
       </p:sp>
@@ -5333,6 +5852,354 @@
           </a:prstGeom>
         </p:spPr>
       </p:pic>
+      <p:grpSp>
+        <p:nvGrpSpPr>
+          <p:cNvPr id="12" name="Grupa 11">
+            <a:extLst>
+              <a:ext uri="{FF2B5EF4-FFF2-40B4-BE49-F238E27FC236}">
+                <a16:creationId xmlns:a16="http://schemas.microsoft.com/office/drawing/2014/main" id="{32E14AD4-F882-621F-DD8E-6664DE3C101B}"/>
+              </a:ext>
+            </a:extLst>
+          </p:cNvPr>
+          <p:cNvGrpSpPr/>
+          <p:nvPr/>
+        </p:nvGrpSpPr>
+        <p:grpSpPr>
+          <a:xfrm>
+            <a:off x="1069690" y="1065845"/>
+            <a:ext cx="1000080" cy="2556360"/>
+            <a:chOff x="1069690" y="1065845"/>
+            <a:chExt cx="1000080" cy="2556360"/>
+          </a:xfrm>
+        </p:grpSpPr>
+        <mc:AlternateContent xmlns:mc="http://schemas.openxmlformats.org/markup-compatibility/2006">
+          <mc:Choice xmlns:p14="http://schemas.microsoft.com/office/powerpoint/2010/main" Requires="p14">
+            <p:contentPart p14:bwMode="auto" r:id="rId5">
+              <p14:nvContentPartPr>
+                <p14:cNvPr id="3" name="Rukopis 2">
+                  <a:extLst>
+                    <a:ext uri="{FF2B5EF4-FFF2-40B4-BE49-F238E27FC236}">
+                      <a16:creationId xmlns:a16="http://schemas.microsoft.com/office/drawing/2014/main" id="{7CBBA3D4-A6FF-65FA-ADE2-DD2C176E739C}"/>
+                    </a:ext>
+                  </a:extLst>
+                </p14:cNvPr>
+                <p14:cNvContentPartPr/>
+                <p14:nvPr/>
+              </p14:nvContentPartPr>
+              <p14:xfrm>
+                <a:off x="1497730" y="1065845"/>
+                <a:ext cx="478080" cy="576360"/>
+              </p14:xfrm>
+            </p:contentPart>
+          </mc:Choice>
+          <mc:Fallback>
+            <p:pic>
+              <p:nvPicPr>
+                <p:cNvPr id="3" name="Rukopis 2">
+                  <a:extLst>
+                    <a:ext uri="{FF2B5EF4-FFF2-40B4-BE49-F238E27FC236}">
+                      <a16:creationId xmlns:a16="http://schemas.microsoft.com/office/drawing/2014/main" id="{7CBBA3D4-A6FF-65FA-ADE2-DD2C176E739C}"/>
+                    </a:ext>
+                  </a:extLst>
+                </p:cNvPr>
+                <p:cNvPicPr/>
+                <p:nvPr/>
+              </p:nvPicPr>
+              <p:blipFill>
+                <a:blip r:embed="rId6"/>
+                <a:stretch>
+                  <a:fillRect/>
+                </a:stretch>
+              </p:blipFill>
+              <p:spPr>
+                <a:xfrm>
+                  <a:off x="1489090" y="1057205"/>
+                  <a:ext cx="495720" cy="594000"/>
+                </a:xfrm>
+                <a:prstGeom prst="rect">
+                  <a:avLst/>
+                </a:prstGeom>
+              </p:spPr>
+            </p:pic>
+          </mc:Fallback>
+        </mc:AlternateContent>
+        <mc:AlternateContent xmlns:mc="http://schemas.openxmlformats.org/markup-compatibility/2006">
+          <mc:Choice xmlns:p14="http://schemas.microsoft.com/office/powerpoint/2010/main" Requires="p14">
+            <p:contentPart p14:bwMode="auto" r:id="rId7">
+              <p14:nvContentPartPr>
+                <p14:cNvPr id="4" name="Rukopis 3">
+                  <a:extLst>
+                    <a:ext uri="{FF2B5EF4-FFF2-40B4-BE49-F238E27FC236}">
+                      <a16:creationId xmlns:a16="http://schemas.microsoft.com/office/drawing/2014/main" id="{939DF303-61F4-D12D-B4F2-1084BDE67F1E}"/>
+                    </a:ext>
+                  </a:extLst>
+                </p14:cNvPr>
+                <p14:cNvContentPartPr/>
+                <p14:nvPr/>
+              </p14:nvContentPartPr>
+              <p14:xfrm>
+                <a:off x="1682770" y="1902485"/>
+                <a:ext cx="387000" cy="615960"/>
+              </p14:xfrm>
+            </p:contentPart>
+          </mc:Choice>
+          <mc:Fallback>
+            <p:pic>
+              <p:nvPicPr>
+                <p:cNvPr id="4" name="Rukopis 3">
+                  <a:extLst>
+                    <a:ext uri="{FF2B5EF4-FFF2-40B4-BE49-F238E27FC236}">
+                      <a16:creationId xmlns:a16="http://schemas.microsoft.com/office/drawing/2014/main" id="{939DF303-61F4-D12D-B4F2-1084BDE67F1E}"/>
+                    </a:ext>
+                  </a:extLst>
+                </p:cNvPr>
+                <p:cNvPicPr/>
+                <p:nvPr/>
+              </p:nvPicPr>
+              <p:blipFill>
+                <a:blip r:embed="rId8"/>
+                <a:stretch>
+                  <a:fillRect/>
+                </a:stretch>
+              </p:blipFill>
+              <p:spPr>
+                <a:xfrm>
+                  <a:off x="1673770" y="1893485"/>
+                  <a:ext cx="404640" cy="633600"/>
+                </a:xfrm>
+                <a:prstGeom prst="rect">
+                  <a:avLst/>
+                </a:prstGeom>
+              </p:spPr>
+            </p:pic>
+          </mc:Fallback>
+        </mc:AlternateContent>
+        <mc:AlternateContent xmlns:mc="http://schemas.openxmlformats.org/markup-compatibility/2006">
+          <mc:Choice xmlns:p14="http://schemas.microsoft.com/office/powerpoint/2010/main" Requires="p14">
+            <p:contentPart p14:bwMode="auto" r:id="rId9">
+              <p14:nvContentPartPr>
+                <p14:cNvPr id="6" name="Rukopis 5">
+                  <a:extLst>
+                    <a:ext uri="{FF2B5EF4-FFF2-40B4-BE49-F238E27FC236}">
+                      <a16:creationId xmlns:a16="http://schemas.microsoft.com/office/drawing/2014/main" id="{76992652-DCE6-5423-D91C-E4C6EF320916}"/>
+                    </a:ext>
+                  </a:extLst>
+                </p14:cNvPr>
+                <p14:cNvContentPartPr/>
+                <p14:nvPr/>
+              </p14:nvContentPartPr>
+              <p14:xfrm>
+                <a:off x="1069690" y="2054765"/>
+                <a:ext cx="382680" cy="668160"/>
+              </p14:xfrm>
+            </p:contentPart>
+          </mc:Choice>
+          <mc:Fallback>
+            <p:pic>
+              <p:nvPicPr>
+                <p:cNvPr id="6" name="Rukopis 5">
+                  <a:extLst>
+                    <a:ext uri="{FF2B5EF4-FFF2-40B4-BE49-F238E27FC236}">
+                      <a16:creationId xmlns:a16="http://schemas.microsoft.com/office/drawing/2014/main" id="{76992652-DCE6-5423-D91C-E4C6EF320916}"/>
+                    </a:ext>
+                  </a:extLst>
+                </p:cNvPr>
+                <p:cNvPicPr/>
+                <p:nvPr/>
+              </p:nvPicPr>
+              <p:blipFill>
+                <a:blip r:embed="rId10"/>
+                <a:stretch>
+                  <a:fillRect/>
+                </a:stretch>
+              </p:blipFill>
+              <p:spPr>
+                <a:xfrm>
+                  <a:off x="1060690" y="2046125"/>
+                  <a:ext cx="400320" cy="685800"/>
+                </a:xfrm>
+                <a:prstGeom prst="rect">
+                  <a:avLst/>
+                </a:prstGeom>
+              </p:spPr>
+            </p:pic>
+          </mc:Fallback>
+        </mc:AlternateContent>
+        <mc:AlternateContent xmlns:mc="http://schemas.openxmlformats.org/markup-compatibility/2006">
+          <mc:Choice xmlns:p14="http://schemas.microsoft.com/office/powerpoint/2010/main" Requires="p14">
+            <p:contentPart p14:bwMode="auto" r:id="rId11">
+              <p14:nvContentPartPr>
+                <p14:cNvPr id="11" name="Rukopis 10">
+                  <a:extLst>
+                    <a:ext uri="{FF2B5EF4-FFF2-40B4-BE49-F238E27FC236}">
+                      <a16:creationId xmlns:a16="http://schemas.microsoft.com/office/drawing/2014/main" id="{F74C1F07-50EF-D377-D69D-F48E27998A59}"/>
+                    </a:ext>
+                  </a:extLst>
+                </p14:cNvPr>
+                <p14:cNvContentPartPr/>
+                <p14:nvPr/>
+              </p14:nvContentPartPr>
+              <p14:xfrm>
+                <a:off x="1283890" y="2952245"/>
+                <a:ext cx="492840" cy="669960"/>
+              </p14:xfrm>
+            </p:contentPart>
+          </mc:Choice>
+          <mc:Fallback>
+            <p:pic>
+              <p:nvPicPr>
+                <p:cNvPr id="11" name="Rukopis 10">
+                  <a:extLst>
+                    <a:ext uri="{FF2B5EF4-FFF2-40B4-BE49-F238E27FC236}">
+                      <a16:creationId xmlns:a16="http://schemas.microsoft.com/office/drawing/2014/main" id="{F74C1F07-50EF-D377-D69D-F48E27998A59}"/>
+                    </a:ext>
+                  </a:extLst>
+                </p:cNvPr>
+                <p:cNvPicPr/>
+                <p:nvPr/>
+              </p:nvPicPr>
+              <p:blipFill>
+                <a:blip r:embed="rId12"/>
+                <a:stretch>
+                  <a:fillRect/>
+                </a:stretch>
+              </p:blipFill>
+              <p:spPr>
+                <a:xfrm>
+                  <a:off x="1274890" y="2943245"/>
+                  <a:ext cx="510480" cy="687600"/>
+                </a:xfrm>
+                <a:prstGeom prst="rect">
+                  <a:avLst/>
+                </a:prstGeom>
+              </p:spPr>
+            </p:pic>
+          </mc:Fallback>
+        </mc:AlternateContent>
+      </p:grpSp>
+      <p:grpSp>
+        <p:nvGrpSpPr>
+          <p:cNvPr id="15" name="Grupa 14">
+            <a:extLst>
+              <a:ext uri="{FF2B5EF4-FFF2-40B4-BE49-F238E27FC236}">
+                <a16:creationId xmlns:a16="http://schemas.microsoft.com/office/drawing/2014/main" id="{7CC34747-1B2A-6421-A02E-EEBDDD8BB00F}"/>
+              </a:ext>
+            </a:extLst>
+          </p:cNvPr>
+          <p:cNvGrpSpPr/>
+          <p:nvPr/>
+        </p:nvGrpSpPr>
+        <p:grpSpPr>
+          <a:xfrm>
+            <a:off x="6789370" y="436205"/>
+            <a:ext cx="496440" cy="605520"/>
+            <a:chOff x="6789370" y="436205"/>
+            <a:chExt cx="496440" cy="605520"/>
+          </a:xfrm>
+        </p:grpSpPr>
+        <mc:AlternateContent xmlns:mc="http://schemas.openxmlformats.org/markup-compatibility/2006">
+          <mc:Choice xmlns:p14="http://schemas.microsoft.com/office/powerpoint/2010/main" Requires="p14">
+            <p:contentPart p14:bwMode="auto" r:id="rId13">
+              <p14:nvContentPartPr>
+                <p14:cNvPr id="13" name="Rukopis 12">
+                  <a:extLst>
+                    <a:ext uri="{FF2B5EF4-FFF2-40B4-BE49-F238E27FC236}">
+                      <a16:creationId xmlns:a16="http://schemas.microsoft.com/office/drawing/2014/main" id="{466BF5D5-8E84-F74C-2DB9-CAF9A9014DBD}"/>
+                    </a:ext>
+                  </a:extLst>
+                </p14:cNvPr>
+                <p14:cNvContentPartPr/>
+                <p14:nvPr/>
+              </p14:nvContentPartPr>
+              <p14:xfrm>
+                <a:off x="6789370" y="467165"/>
+                <a:ext cx="387720" cy="559440"/>
+              </p14:xfrm>
+            </p:contentPart>
+          </mc:Choice>
+          <mc:Fallback>
+            <p:pic>
+              <p:nvPicPr>
+                <p:cNvPr id="13" name="Rukopis 12">
+                  <a:extLst>
+                    <a:ext uri="{FF2B5EF4-FFF2-40B4-BE49-F238E27FC236}">
+                      <a16:creationId xmlns:a16="http://schemas.microsoft.com/office/drawing/2014/main" id="{466BF5D5-8E84-F74C-2DB9-CAF9A9014DBD}"/>
+                    </a:ext>
+                  </a:extLst>
+                </p:cNvPr>
+                <p:cNvPicPr/>
+                <p:nvPr/>
+              </p:nvPicPr>
+              <p:blipFill>
+                <a:blip r:embed="rId14"/>
+                <a:stretch>
+                  <a:fillRect/>
+                </a:stretch>
+              </p:blipFill>
+              <p:spPr>
+                <a:xfrm>
+                  <a:off x="6780730" y="458525"/>
+                  <a:ext cx="405360" cy="577080"/>
+                </a:xfrm>
+                <a:prstGeom prst="rect">
+                  <a:avLst/>
+                </a:prstGeom>
+              </p:spPr>
+            </p:pic>
+          </mc:Fallback>
+        </mc:AlternateContent>
+        <mc:AlternateContent xmlns:mc="http://schemas.openxmlformats.org/markup-compatibility/2006">
+          <mc:Choice xmlns:p14="http://schemas.microsoft.com/office/powerpoint/2010/main" Requires="p14">
+            <p:contentPart p14:bwMode="auto" r:id="rId15">
+              <p14:nvContentPartPr>
+                <p14:cNvPr id="14" name="Rukopis 13">
+                  <a:extLst>
+                    <a:ext uri="{FF2B5EF4-FFF2-40B4-BE49-F238E27FC236}">
+                      <a16:creationId xmlns:a16="http://schemas.microsoft.com/office/drawing/2014/main" id="{D1490D2D-27CE-DE4C-7B5B-F86CFBD2D4EE}"/>
+                    </a:ext>
+                  </a:extLst>
+                </p14:cNvPr>
+                <p14:cNvContentPartPr/>
+                <p14:nvPr/>
+              </p14:nvContentPartPr>
+              <p14:xfrm>
+                <a:off x="6915730" y="436205"/>
+                <a:ext cx="370080" cy="605520"/>
+              </p14:xfrm>
+            </p:contentPart>
+          </mc:Choice>
+          <mc:Fallback>
+            <p:pic>
+              <p:nvPicPr>
+                <p:cNvPr id="14" name="Rukopis 13">
+                  <a:extLst>
+                    <a:ext uri="{FF2B5EF4-FFF2-40B4-BE49-F238E27FC236}">
+                      <a16:creationId xmlns:a16="http://schemas.microsoft.com/office/drawing/2014/main" id="{D1490D2D-27CE-DE4C-7B5B-F86CFBD2D4EE}"/>
+                    </a:ext>
+                  </a:extLst>
+                </p:cNvPr>
+                <p:cNvPicPr/>
+                <p:nvPr/>
+              </p:nvPicPr>
+              <p:blipFill>
+                <a:blip r:embed="rId16"/>
+                <a:stretch>
+                  <a:fillRect/>
+                </a:stretch>
+              </p:blipFill>
+              <p:spPr>
+                <a:xfrm>
+                  <a:off x="6907090" y="427205"/>
+                  <a:ext cx="387720" cy="623160"/>
+                </a:xfrm>
+                <a:prstGeom prst="rect">
+                  <a:avLst/>
+                </a:prstGeom>
+              </p:spPr>
+            </p:pic>
+          </mc:Fallback>
+        </mc:AlternateContent>
+      </p:grpSp>
     </p:spTree>
     <p:extLst>
       <p:ext uri="{BB962C8B-B14F-4D97-AF65-F5344CB8AC3E}">
@@ -5522,7 +6389,7 @@
           <a:lstStyle/>
           <a:p>
             <a:r>
-              <a:rPr lang="en-US" b="1">
+              <a:rPr lang="en-US" b="1" dirty="0">
                 <a:solidFill>
                   <a:schemeClr val="tx1">
                     <a:lumMod val="95000"/>
@@ -5532,7 +6399,7 @@
               </a:rPr>
               <a:t>3.  Graph: clutch factor</a:t>
             </a:r>
-            <a:endParaRPr lang="en-US">
+            <a:endParaRPr lang="en-US" dirty="0">
               <a:solidFill>
                 <a:schemeClr val="tx1">
                   <a:lumMod val="95000"/>
@@ -5542,10 +6409,10 @@
             </a:endParaRPr>
           </a:p>
           <a:p>
-            <a:endParaRPr lang="en-US"/>
-          </a:p>
-          <a:p>
-            <a:endParaRPr lang="en-US"/>
+            <a:endParaRPr lang="en-US" dirty="0"/>
+          </a:p>
+          <a:p>
+            <a:endParaRPr lang="en-US" dirty="0"/>
           </a:p>
         </p:txBody>
       </p:sp>

</xml_diff>

<commit_message>
Final commit, sve radi
</commit_message>
<xml_diff>
--- a/presentations/1_mockup_presentation.pptx
+++ b/presentations/1_mockup_presentation.pptx
@@ -439,6 +439,62 @@
 </inkml:ink>
 </file>
 
+<file path=ppt/ink/ink11.xml><?xml version="1.0" encoding="utf-8"?>
+<inkml:ink xmlns:inkml="http://www.w3.org/2003/InkML">
+  <inkml:definitions>
+    <inkml:context xml:id="ctx0">
+      <inkml:inkSource xml:id="inkSrc0">
+        <inkml:traceFormat>
+          <inkml:channel name="X" type="integer" min="-2.14748E9" max="2.14748E9" units="cm"/>
+          <inkml:channel name="Y" type="integer" min="-2.14748E9" max="2.14748E9" units="cm"/>
+          <inkml:channel name="F" type="integer" max="32767" units="dev"/>
+        </inkml:traceFormat>
+        <inkml:channelProperties>
+          <inkml:channelProperty channel="X" name="resolution" value="1000" units="1/cm"/>
+          <inkml:channelProperty channel="Y" name="resolution" value="1000" units="1/cm"/>
+          <inkml:channelProperty channel="F" name="resolution" value="0" units="1/dev"/>
+        </inkml:channelProperties>
+      </inkml:inkSource>
+      <inkml:timestamp xml:id="ts0" timeString="2025-11-24T02:21:04.410"/>
+    </inkml:context>
+    <inkml:brush xml:id="br0">
+      <inkml:brushProperty name="width" value="0.05" units="cm"/>
+      <inkml:brushProperty name="height" value="0.05" units="cm"/>
+      <inkml:brushProperty name="color" value="#E71224"/>
+    </inkml:brush>
+  </inkml:definitions>
+  <inkml:trace contextRef="#ctx0" brushRef="#br0">0 1407 24575,'6'1'0,"0"0"0,-1 0 0,1 1 0,0-1 0,-1 1 0,0 1 0,0-1 0,1 1 0,6 4 0,0 1 0,25 14 0,51 40 0,-29-18 0,-58-43 0,0 0 0,0 0 0,0 0 0,0-1 0,0 1 0,0 0 0,1-1 0,-1 1 0,0-1 0,0 1 0,0-1 0,1 1 0,-1-1 0,0 0 0,0 0 0,1 0 0,-1 0 0,0 0 0,1 0 0,-1 0 0,0 0 0,0 0 0,1-1 0,-1 1 0,0 0 0,0-1 0,2 0 0,0-2 0,0 1 0,0-1 0,-1 0 0,0 0 0,1 0 0,-1-1 0,0 1 0,2-7 0,52-101 0,150-276 0,-3 71-682,294-352-1,-453 613-6143</inkml:trace>
+</inkml:ink>
+</file>
+
+<file path=ppt/ink/ink12.xml><?xml version="1.0" encoding="utf-8"?>
+<inkml:ink xmlns:inkml="http://www.w3.org/2003/InkML">
+  <inkml:definitions>
+    <inkml:context xml:id="ctx0">
+      <inkml:inkSource xml:id="inkSrc0">
+        <inkml:traceFormat>
+          <inkml:channel name="X" type="integer" min="-2.14748E9" max="2.14748E9" units="cm"/>
+          <inkml:channel name="Y" type="integer" min="-2.14748E9" max="2.14748E9" units="cm"/>
+          <inkml:channel name="F" type="integer" max="32767" units="dev"/>
+        </inkml:traceFormat>
+        <inkml:channelProperties>
+          <inkml:channelProperty channel="X" name="resolution" value="1000" units="1/cm"/>
+          <inkml:channelProperty channel="Y" name="resolution" value="1000" units="1/cm"/>
+          <inkml:channelProperty channel="F" name="resolution" value="0" units="1/dev"/>
+        </inkml:channelProperties>
+      </inkml:inkSource>
+      <inkml:timestamp xml:id="ts0" timeString="2025-11-24T02:21:05.595"/>
+    </inkml:context>
+    <inkml:brush xml:id="br0">
+      <inkml:brushProperty name="width" value="0.05" units="cm"/>
+      <inkml:brushProperty name="height" value="0.05" units="cm"/>
+      <inkml:brushProperty name="color" value="#E71224"/>
+    </inkml:brush>
+  </inkml:definitions>
+  <inkml:trace contextRef="#ctx0" brushRef="#br0">1 2112 24575,'0'5'0,"1"0"0,1 0 0,-1 0 0,1 0 0,0-1 0,0 1 0,0-1 0,1 1 0,5 6 0,1 4 0,76 147 0,-70-146 0,-14-15 0,-1-1 0,1 0 0,0 0 0,-1 1 0,1-1 0,-1 0 0,1 0 0,0 0 0,-1 0 0,1 0 0,0 0 0,-1 0 0,1 0 0,-1 0 0,1 0 0,0 0 0,-1-1 0,1 1 0,-1 0 0,1 0 0,1-1 0,1-2 0,0 0 0,1-1 0,-1 1 0,0-1 0,-1 1 0,1-1 0,-1 0 0,4-7 0,76-151 0,-24 42 0,90-159 0,840-1263-2400,-888 1408 1389,-33 51-3769</inkml:trace>
+</inkml:ink>
+</file>
+
 <file path=ppt/ink/ink2.xml><?xml version="1.0" encoding="utf-8"?>
 <inkml:ink xmlns:inkml="http://www.w3.org/2003/InkML">
   <inkml:definitions>
@@ -745,7 +801,7 @@
           <a:p>
             <a:fld id="{2139599A-F55A-43CD-BD42-27C7A89EA2FB}" type="datetimeFigureOut">
               <a:rPr lang="hr-HR" smtClean="0"/>
-              <a:t>20.11.2025.</a:t>
+              <a:t>24.11.2025.</a:t>
             </a:fld>
             <a:endParaRPr lang="hr-HR"/>
           </a:p>
@@ -1225,7 +1281,7 @@
           <a:p>
             <a:fld id="{F971FB43-724D-437A-A5E8-1D673BA80D2D}" type="datetimeFigureOut">
               <a:rPr lang="hr-HR" smtClean="0"/>
-              <a:t>20.11.2025.</a:t>
+              <a:t>24.11.2025.</a:t>
             </a:fld>
             <a:endParaRPr lang="hr-HR"/>
           </a:p>
@@ -1393,7 +1449,7 @@
           <a:p>
             <a:fld id="{F971FB43-724D-437A-A5E8-1D673BA80D2D}" type="datetimeFigureOut">
               <a:rPr lang="hr-HR" smtClean="0"/>
-              <a:t>20.11.2025.</a:t>
+              <a:t>24.11.2025.</a:t>
             </a:fld>
             <a:endParaRPr lang="hr-HR"/>
           </a:p>
@@ -1571,7 +1627,7 @@
           <a:p>
             <a:fld id="{F971FB43-724D-437A-A5E8-1D673BA80D2D}" type="datetimeFigureOut">
               <a:rPr lang="hr-HR" smtClean="0"/>
-              <a:t>20.11.2025.</a:t>
+              <a:t>24.11.2025.</a:t>
             </a:fld>
             <a:endParaRPr lang="hr-HR"/>
           </a:p>
@@ -1739,7 +1795,7 @@
           <a:p>
             <a:fld id="{F971FB43-724D-437A-A5E8-1D673BA80D2D}" type="datetimeFigureOut">
               <a:rPr lang="hr-HR" smtClean="0"/>
-              <a:t>20.11.2025.</a:t>
+              <a:t>24.11.2025.</a:t>
             </a:fld>
             <a:endParaRPr lang="hr-HR"/>
           </a:p>
@@ -1984,7 +2040,7 @@
           <a:p>
             <a:fld id="{F971FB43-724D-437A-A5E8-1D673BA80D2D}" type="datetimeFigureOut">
               <a:rPr lang="hr-HR" smtClean="0"/>
-              <a:t>20.11.2025.</a:t>
+              <a:t>24.11.2025.</a:t>
             </a:fld>
             <a:endParaRPr lang="hr-HR"/>
           </a:p>
@@ -2213,7 +2269,7 @@
           <a:p>
             <a:fld id="{F971FB43-724D-437A-A5E8-1D673BA80D2D}" type="datetimeFigureOut">
               <a:rPr lang="hr-HR" smtClean="0"/>
-              <a:t>20.11.2025.</a:t>
+              <a:t>24.11.2025.</a:t>
             </a:fld>
             <a:endParaRPr lang="hr-HR"/>
           </a:p>
@@ -2577,7 +2633,7 @@
           <a:p>
             <a:fld id="{F971FB43-724D-437A-A5E8-1D673BA80D2D}" type="datetimeFigureOut">
               <a:rPr lang="hr-HR" smtClean="0"/>
-              <a:t>20.11.2025.</a:t>
+              <a:t>24.11.2025.</a:t>
             </a:fld>
             <a:endParaRPr lang="hr-HR"/>
           </a:p>
@@ -2694,7 +2750,7 @@
           <a:p>
             <a:fld id="{F971FB43-724D-437A-A5E8-1D673BA80D2D}" type="datetimeFigureOut">
               <a:rPr lang="hr-HR" smtClean="0"/>
-              <a:t>20.11.2025.</a:t>
+              <a:t>24.11.2025.</a:t>
             </a:fld>
             <a:endParaRPr lang="hr-HR"/>
           </a:p>
@@ -2789,7 +2845,7 @@
           <a:p>
             <a:fld id="{F971FB43-724D-437A-A5E8-1D673BA80D2D}" type="datetimeFigureOut">
               <a:rPr lang="hr-HR" smtClean="0"/>
-              <a:t>20.11.2025.</a:t>
+              <a:t>24.11.2025.</a:t>
             </a:fld>
             <a:endParaRPr lang="hr-HR"/>
           </a:p>
@@ -3064,7 +3120,7 @@
           <a:p>
             <a:fld id="{F971FB43-724D-437A-A5E8-1D673BA80D2D}" type="datetimeFigureOut">
               <a:rPr lang="hr-HR" smtClean="0"/>
-              <a:t>20.11.2025.</a:t>
+              <a:t>24.11.2025.</a:t>
             </a:fld>
             <a:endParaRPr lang="hr-HR"/>
           </a:p>
@@ -3316,7 +3372,7 @@
           <a:p>
             <a:fld id="{F971FB43-724D-437A-A5E8-1D673BA80D2D}" type="datetimeFigureOut">
               <a:rPr lang="hr-HR" smtClean="0"/>
-              <a:t>20.11.2025.</a:t>
+              <a:t>24.11.2025.</a:t>
             </a:fld>
             <a:endParaRPr lang="hr-HR"/>
           </a:p>
@@ -3527,7 +3583,7 @@
           <a:p>
             <a:fld id="{F971FB43-724D-437A-A5E8-1D673BA80D2D}" type="datetimeFigureOut">
               <a:rPr lang="hr-HR" smtClean="0"/>
-              <a:t>20.11.2025.</a:t>
+              <a:t>24.11.2025.</a:t>
             </a:fld>
             <a:endParaRPr lang="hr-HR"/>
           </a:p>
@@ -5872,8 +5928,8 @@
             <a:chExt cx="1000080" cy="2556360"/>
           </a:xfrm>
         </p:grpSpPr>
-        <mc:AlternateContent xmlns:mc="http://schemas.openxmlformats.org/markup-compatibility/2006">
-          <mc:Choice xmlns:p14="http://schemas.microsoft.com/office/powerpoint/2010/main" Requires="p14">
+        <mc:AlternateContent xmlns:mc="http://schemas.openxmlformats.org/markup-compatibility/2006" xmlns:p14="http://schemas.microsoft.com/office/powerpoint/2010/main">
+          <mc:Choice Requires="p14">
             <p:contentPart p14:bwMode="auto" r:id="rId5">
               <p14:nvContentPartPr>
                 <p14:cNvPr id="3" name="Rukopis 2">
@@ -5892,7 +5948,7 @@
               </p14:xfrm>
             </p:contentPart>
           </mc:Choice>
-          <mc:Fallback>
+          <mc:Fallback xmlns="">
             <p:pic>
               <p:nvPicPr>
                 <p:cNvPr id="3" name="Rukopis 2">
@@ -5923,8 +5979,8 @@
             </p:pic>
           </mc:Fallback>
         </mc:AlternateContent>
-        <mc:AlternateContent xmlns:mc="http://schemas.openxmlformats.org/markup-compatibility/2006">
-          <mc:Choice xmlns:p14="http://schemas.microsoft.com/office/powerpoint/2010/main" Requires="p14">
+        <mc:AlternateContent xmlns:mc="http://schemas.openxmlformats.org/markup-compatibility/2006" xmlns:p14="http://schemas.microsoft.com/office/powerpoint/2010/main">
+          <mc:Choice Requires="p14">
             <p:contentPart p14:bwMode="auto" r:id="rId7">
               <p14:nvContentPartPr>
                 <p14:cNvPr id="4" name="Rukopis 3">
@@ -5943,7 +5999,7 @@
               </p14:xfrm>
             </p:contentPart>
           </mc:Choice>
-          <mc:Fallback>
+          <mc:Fallback xmlns="">
             <p:pic>
               <p:nvPicPr>
                 <p:cNvPr id="4" name="Rukopis 3">
@@ -5974,8 +6030,8 @@
             </p:pic>
           </mc:Fallback>
         </mc:AlternateContent>
-        <mc:AlternateContent xmlns:mc="http://schemas.openxmlformats.org/markup-compatibility/2006">
-          <mc:Choice xmlns:p14="http://schemas.microsoft.com/office/powerpoint/2010/main" Requires="p14">
+        <mc:AlternateContent xmlns:mc="http://schemas.openxmlformats.org/markup-compatibility/2006" xmlns:p14="http://schemas.microsoft.com/office/powerpoint/2010/main">
+          <mc:Choice Requires="p14">
             <p:contentPart p14:bwMode="auto" r:id="rId9">
               <p14:nvContentPartPr>
                 <p14:cNvPr id="6" name="Rukopis 5">
@@ -5994,7 +6050,7 @@
               </p14:xfrm>
             </p:contentPart>
           </mc:Choice>
-          <mc:Fallback>
+          <mc:Fallback xmlns="">
             <p:pic>
               <p:nvPicPr>
                 <p:cNvPr id="6" name="Rukopis 5">
@@ -6025,8 +6081,8 @@
             </p:pic>
           </mc:Fallback>
         </mc:AlternateContent>
-        <mc:AlternateContent xmlns:mc="http://schemas.openxmlformats.org/markup-compatibility/2006">
-          <mc:Choice xmlns:p14="http://schemas.microsoft.com/office/powerpoint/2010/main" Requires="p14">
+        <mc:AlternateContent xmlns:mc="http://schemas.openxmlformats.org/markup-compatibility/2006" xmlns:p14="http://schemas.microsoft.com/office/powerpoint/2010/main">
+          <mc:Choice Requires="p14">
             <p:contentPart p14:bwMode="auto" r:id="rId11">
               <p14:nvContentPartPr>
                 <p14:cNvPr id="11" name="Rukopis 10">
@@ -6045,7 +6101,7 @@
               </p14:xfrm>
             </p:contentPart>
           </mc:Choice>
-          <mc:Fallback>
+          <mc:Fallback xmlns="">
             <p:pic>
               <p:nvPicPr>
                 <p:cNvPr id="11" name="Rukopis 10">
@@ -6097,8 +6153,8 @@
             <a:chExt cx="496440" cy="605520"/>
           </a:xfrm>
         </p:grpSpPr>
-        <mc:AlternateContent xmlns:mc="http://schemas.openxmlformats.org/markup-compatibility/2006">
-          <mc:Choice xmlns:p14="http://schemas.microsoft.com/office/powerpoint/2010/main" Requires="p14">
+        <mc:AlternateContent xmlns:mc="http://schemas.openxmlformats.org/markup-compatibility/2006" xmlns:p14="http://schemas.microsoft.com/office/powerpoint/2010/main">
+          <mc:Choice Requires="p14">
             <p:contentPart p14:bwMode="auto" r:id="rId13">
               <p14:nvContentPartPr>
                 <p14:cNvPr id="13" name="Rukopis 12">
@@ -6117,7 +6173,7 @@
               </p14:xfrm>
             </p:contentPart>
           </mc:Choice>
-          <mc:Fallback>
+          <mc:Fallback xmlns="">
             <p:pic>
               <p:nvPicPr>
                 <p:cNvPr id="13" name="Rukopis 12">
@@ -6148,8 +6204,8 @@
             </p:pic>
           </mc:Fallback>
         </mc:AlternateContent>
-        <mc:AlternateContent xmlns:mc="http://schemas.openxmlformats.org/markup-compatibility/2006">
-          <mc:Choice xmlns:p14="http://schemas.microsoft.com/office/powerpoint/2010/main" Requires="p14">
+        <mc:AlternateContent xmlns:mc="http://schemas.openxmlformats.org/markup-compatibility/2006" xmlns:p14="http://schemas.microsoft.com/office/powerpoint/2010/main">
+          <mc:Choice Requires="p14">
             <p:contentPart p14:bwMode="auto" r:id="rId15">
               <p14:nvContentPartPr>
                 <p14:cNvPr id="14" name="Rukopis 13">
@@ -6168,7 +6224,7 @@
               </p14:xfrm>
             </p:contentPart>
           </mc:Choice>
-          <mc:Fallback>
+          <mc:Fallback xmlns="">
             <p:pic>
               <p:nvPicPr>
                 <p:cNvPr id="14" name="Rukopis 13">
@@ -6553,6 +6609,129 @@
           </a:p>
         </p:txBody>
       </p:sp>
+      <p:grpSp>
+        <p:nvGrpSpPr>
+          <p:cNvPr id="5" name="Grupa 4">
+            <a:extLst>
+              <a:ext uri="{FF2B5EF4-FFF2-40B4-BE49-F238E27FC236}">
+                <a16:creationId xmlns:a16="http://schemas.microsoft.com/office/drawing/2014/main" id="{006B41BB-C466-93CB-B431-82DF253954CE}"/>
+              </a:ext>
+            </a:extLst>
+          </p:cNvPr>
+          <p:cNvGrpSpPr/>
+          <p:nvPr/>
+        </p:nvGrpSpPr>
+        <p:grpSpPr>
+          <a:xfrm>
+            <a:off x="1118290" y="2771525"/>
+            <a:ext cx="787680" cy="1510920"/>
+            <a:chOff x="1118290" y="2771525"/>
+            <a:chExt cx="787680" cy="1510920"/>
+          </a:xfrm>
+        </p:grpSpPr>
+        <mc:AlternateContent xmlns:mc="http://schemas.openxmlformats.org/markup-compatibility/2006">
+          <mc:Choice xmlns:p14="http://schemas.microsoft.com/office/powerpoint/2010/main" Requires="p14">
+            <p:contentPart p14:bwMode="auto" r:id="rId4">
+              <p14:nvContentPartPr>
+                <p14:cNvPr id="3" name="Rukopis 2">
+                  <a:extLst>
+                    <a:ext uri="{FF2B5EF4-FFF2-40B4-BE49-F238E27FC236}">
+                      <a16:creationId xmlns:a16="http://schemas.microsoft.com/office/drawing/2014/main" id="{E186BE4F-970C-4355-2395-37F62FE57386}"/>
+                    </a:ext>
+                  </a:extLst>
+                </p14:cNvPr>
+                <p14:cNvContentPartPr/>
+                <p14:nvPr/>
+              </p14:nvContentPartPr>
+              <p14:xfrm>
+                <a:off x="1118290" y="2771525"/>
+                <a:ext cx="476640" cy="567360"/>
+              </p14:xfrm>
+            </p:contentPart>
+          </mc:Choice>
+          <mc:Fallback>
+            <p:pic>
+              <p:nvPicPr>
+                <p:cNvPr id="3" name="Rukopis 2">
+                  <a:extLst>
+                    <a:ext uri="{FF2B5EF4-FFF2-40B4-BE49-F238E27FC236}">
+                      <a16:creationId xmlns:a16="http://schemas.microsoft.com/office/drawing/2014/main" id="{E186BE4F-970C-4355-2395-37F62FE57386}"/>
+                    </a:ext>
+                  </a:extLst>
+                </p:cNvPr>
+                <p:cNvPicPr/>
+                <p:nvPr/>
+              </p:nvPicPr>
+              <p:blipFill>
+                <a:blip r:embed="rId5"/>
+                <a:stretch>
+                  <a:fillRect/>
+                </a:stretch>
+              </p:blipFill>
+              <p:spPr>
+                <a:xfrm>
+                  <a:off x="1109290" y="2762885"/>
+                  <a:ext cx="494280" cy="585000"/>
+                </a:xfrm>
+                <a:prstGeom prst="rect">
+                  <a:avLst/>
+                </a:prstGeom>
+              </p:spPr>
+            </p:pic>
+          </mc:Fallback>
+        </mc:AlternateContent>
+        <mc:AlternateContent xmlns:mc="http://schemas.openxmlformats.org/markup-compatibility/2006">
+          <mc:Choice xmlns:p14="http://schemas.microsoft.com/office/powerpoint/2010/main" Requires="p14">
+            <p:contentPart p14:bwMode="auto" r:id="rId6">
+              <p14:nvContentPartPr>
+                <p14:cNvPr id="4" name="Rukopis 3">
+                  <a:extLst>
+                    <a:ext uri="{FF2B5EF4-FFF2-40B4-BE49-F238E27FC236}">
+                      <a16:creationId xmlns:a16="http://schemas.microsoft.com/office/drawing/2014/main" id="{7F95DF75-56D6-8F22-DEFF-F0351258DFBA}"/>
+                    </a:ext>
+                  </a:extLst>
+                </p14:cNvPr>
+                <p14:cNvContentPartPr/>
+                <p14:nvPr/>
+              </p14:nvContentPartPr>
+              <p14:xfrm>
+                <a:off x="1322770" y="3432125"/>
+                <a:ext cx="583200" cy="850320"/>
+              </p14:xfrm>
+            </p:contentPart>
+          </mc:Choice>
+          <mc:Fallback>
+            <p:pic>
+              <p:nvPicPr>
+                <p:cNvPr id="4" name="Rukopis 3">
+                  <a:extLst>
+                    <a:ext uri="{FF2B5EF4-FFF2-40B4-BE49-F238E27FC236}">
+                      <a16:creationId xmlns:a16="http://schemas.microsoft.com/office/drawing/2014/main" id="{7F95DF75-56D6-8F22-DEFF-F0351258DFBA}"/>
+                    </a:ext>
+                  </a:extLst>
+                </p:cNvPr>
+                <p:cNvPicPr/>
+                <p:nvPr/>
+              </p:nvPicPr>
+              <p:blipFill>
+                <a:blip r:embed="rId7"/>
+                <a:stretch>
+                  <a:fillRect/>
+                </a:stretch>
+              </p:blipFill>
+              <p:spPr>
+                <a:xfrm>
+                  <a:off x="1314130" y="3423125"/>
+                  <a:ext cx="600840" cy="867960"/>
+                </a:xfrm>
+                <a:prstGeom prst="rect">
+                  <a:avLst/>
+                </a:prstGeom>
+              </p:spPr>
+            </p:pic>
+          </mc:Fallback>
+        </mc:AlternateContent>
+      </p:grpSp>
     </p:spTree>
     <p:extLst>
       <p:ext uri="{BB962C8B-B14F-4D97-AF65-F5344CB8AC3E}">

</xml_diff>